<commit_message>
checked and updated second set of slides
</commit_message>
<xml_diff>
--- a/doc/slides/day1/session2/NGSdata.pptx
+++ b/doc/slides/day1/session2/NGSdata.pptx
@@ -1,11 +1,11 @@
 
 <file path=ppt/presentation.xml><?xml version="1.0" encoding="utf-8"?>
-<p:presentation xmlns:a="http://schemas.openxmlformats.org/drawingml/2006/main" xmlns:r="http://schemas.openxmlformats.org/officeDocument/2006/relationships" xmlns:mc="http://schemas.openxmlformats.org/markup-compatibility/2006" xmlns:mv="urn:schemas-microsoft-com:mac:vml" xmlns:p="http://schemas.openxmlformats.org/presentationml/2006/main" mc:Ignorable="mv" mc:PreserveAttributes="mv:*" saveSubsetFonts="1" autoCompressPictures="0">
+<p:presentation xmlns:a="http://schemas.openxmlformats.org/drawingml/2006/main" xmlns:r="http://schemas.openxmlformats.org/officeDocument/2006/relationships" xmlns:p="http://schemas.openxmlformats.org/presentationml/2006/main" saveSubsetFonts="1" autoCompressPictures="0">
   <p:sldMasterIdLst>
     <p:sldMasterId id="2147483648" r:id="rId1"/>
   </p:sldMasterIdLst>
   <p:notesMasterIdLst>
-    <p:notesMasterId r:id="rId16"/>
+    <p:notesMasterId r:id="rId15"/>
   </p:notesMasterIdLst>
   <p:sldIdLst>
     <p:sldId id="256" r:id="rId2"/>
@@ -16,12 +16,11 @@
     <p:sldId id="268" r:id="rId7"/>
     <p:sldId id="270" r:id="rId8"/>
     <p:sldId id="258" r:id="rId9"/>
-    <p:sldId id="259" r:id="rId10"/>
-    <p:sldId id="260" r:id="rId11"/>
-    <p:sldId id="272" r:id="rId12"/>
-    <p:sldId id="274" r:id="rId13"/>
-    <p:sldId id="275" r:id="rId14"/>
-    <p:sldId id="266" r:id="rId15"/>
+    <p:sldId id="260" r:id="rId10"/>
+    <p:sldId id="272" r:id="rId11"/>
+    <p:sldId id="274" r:id="rId12"/>
+    <p:sldId id="275" r:id="rId13"/>
+    <p:sldId id="266" r:id="rId14"/>
   </p:sldIdLst>
   <p:sldSz cx="9144000" cy="6858000" type="screen4x3"/>
   <p:notesSz cx="6858000" cy="9144000"/>
@@ -124,7 +123,7 @@
 </file>
 
 <file path=ppt/notesMasters/notesMaster1.xml><?xml version="1.0" encoding="utf-8"?>
-<p:notesMaster xmlns:a="http://schemas.openxmlformats.org/drawingml/2006/main" xmlns:r="http://schemas.openxmlformats.org/officeDocument/2006/relationships" xmlns:mc="http://schemas.openxmlformats.org/markup-compatibility/2006" xmlns:mv="urn:schemas-microsoft-com:mac:vml" xmlns:p="http://schemas.openxmlformats.org/presentationml/2006/main" mc:Ignorable="mv" mc:PreserveAttributes="mv:*">
+<p:notesMaster xmlns:a="http://schemas.openxmlformats.org/drawingml/2006/main" xmlns:r="http://schemas.openxmlformats.org/officeDocument/2006/relationships" xmlns:p="http://schemas.openxmlformats.org/presentationml/2006/main">
   <p:cSld>
     <p:bg>
       <p:bgRef idx="1001">
@@ -206,7 +205,7 @@
             <a:fld id="{1CBEE33A-660E-C84A-B828-66CD4386E7A3}" type="datetimeFigureOut">
               <a:rPr lang="en-US" smtClean="0"/>
               <a:pPr/>
-              <a:t>9/11/12</a:t>
+              <a:t>10/17/13</a:t>
             </a:fld>
             <a:endParaRPr lang="en-US"/>
           </a:p>
@@ -368,13 +367,18 @@
             <a:fld id="{DC52FE66-5F38-224B-B84A-AC7B0050D720}" type="slidenum">
               <a:rPr lang="en-US" smtClean="0"/>
               <a:pPr/>
-              <a:t>‹#›</a:t>
+              <a:t>‹nr.›</a:t>
             </a:fld>
             <a:endParaRPr lang="en-US"/>
           </a:p>
         </p:txBody>
       </p:sp>
     </p:spTree>
+    <p:extLst>
+      <p:ext uri="{BB962C8B-B14F-4D97-AF65-F5344CB8AC3E}">
+        <p14:creationId xmlns:p14="http://schemas.microsoft.com/office/powerpoint/2010/main" val="2978038060"/>
+      </p:ext>
+    </p:extLst>
   </p:cSld>
   <p:clrMap bg1="lt1" tx1="dk1" bg2="lt2" tx2="dk2" accent1="accent1" accent2="accent2" accent3="accent3" accent4="accent4" accent5="accent5" accent6="accent6" hlink="hlink" folHlink="folHlink"/>
   <p:notesStyle>
@@ -473,7 +477,7 @@
 </file>
 
 <file path=ppt/notesSlides/notesSlide1.xml><?xml version="1.0" encoding="utf-8"?>
-<p:notes xmlns:a="http://schemas.openxmlformats.org/drawingml/2006/main" xmlns:r="http://schemas.openxmlformats.org/officeDocument/2006/relationships" xmlns:mc="http://schemas.openxmlformats.org/markup-compatibility/2006" xmlns:mv="urn:schemas-microsoft-com:mac:vml" xmlns:p="http://schemas.openxmlformats.org/presentationml/2006/main" mc:Ignorable="mv" mc:PreserveAttributes="mv:*">
+<p:notes xmlns:a="http://schemas.openxmlformats.org/drawingml/2006/main" xmlns:r="http://schemas.openxmlformats.org/officeDocument/2006/relationships" xmlns:p="http://schemas.openxmlformats.org/presentationml/2006/main">
   <p:cSld>
     <p:spTree>
       <p:nvGrpSpPr>
@@ -575,7 +579,7 @@
 </file>
 
 <file path=ppt/notesSlides/notesSlide2.xml><?xml version="1.0" encoding="utf-8"?>
-<p:notes xmlns:a="http://schemas.openxmlformats.org/drawingml/2006/main" xmlns:r="http://schemas.openxmlformats.org/officeDocument/2006/relationships" xmlns:mc="http://schemas.openxmlformats.org/markup-compatibility/2006" xmlns:mv="urn:schemas-microsoft-com:mac:vml" xmlns:p="http://schemas.openxmlformats.org/presentationml/2006/main" mc:Ignorable="mv" mc:PreserveAttributes="mv:*">
+<p:notes xmlns:a="http://schemas.openxmlformats.org/drawingml/2006/main" xmlns:r="http://schemas.openxmlformats.org/officeDocument/2006/relationships" xmlns:p="http://schemas.openxmlformats.org/presentationml/2006/main">
   <p:cSld>
     <p:spTree>
       <p:nvGrpSpPr>
@@ -705,7 +709,7 @@
 </file>
 
 <file path=ppt/notesSlides/notesSlide3.xml><?xml version="1.0" encoding="utf-8"?>
-<p:notes xmlns:a="http://schemas.openxmlformats.org/drawingml/2006/main" xmlns:r="http://schemas.openxmlformats.org/officeDocument/2006/relationships" xmlns:mc="http://schemas.openxmlformats.org/markup-compatibility/2006" xmlns:mv="urn:schemas-microsoft-com:mac:vml" xmlns:p="http://schemas.openxmlformats.org/presentationml/2006/main" mc:Ignorable="mv" mc:PreserveAttributes="mv:*">
+<p:notes xmlns:a="http://schemas.openxmlformats.org/drawingml/2006/main" xmlns:r="http://schemas.openxmlformats.org/officeDocument/2006/relationships" xmlns:p="http://schemas.openxmlformats.org/presentationml/2006/main">
   <p:cSld>
     <p:spTree>
       <p:nvGrpSpPr>
@@ -795,7 +799,7 @@
 </file>
 
 <file path=ppt/notesSlides/notesSlide4.xml><?xml version="1.0" encoding="utf-8"?>
-<p:notes xmlns:a="http://schemas.openxmlformats.org/drawingml/2006/main" xmlns:r="http://schemas.openxmlformats.org/officeDocument/2006/relationships" xmlns:mc="http://schemas.openxmlformats.org/markup-compatibility/2006" xmlns:mv="urn:schemas-microsoft-com:mac:vml" xmlns:p="http://schemas.openxmlformats.org/presentationml/2006/main" mc:Ignorable="mv" mc:PreserveAttributes="mv:*">
+<p:notes xmlns:a="http://schemas.openxmlformats.org/drawingml/2006/main" xmlns:r="http://schemas.openxmlformats.org/officeDocument/2006/relationships" xmlns:p="http://schemas.openxmlformats.org/presentationml/2006/main">
   <p:cSld>
     <p:spTree>
       <p:nvGrpSpPr>
@@ -842,47 +846,39 @@
           <a:p>
             <a:r>
               <a:rPr lang="en-US" dirty="0" smtClean="0"/>
-              <a:t>454 reads differ from standard sequencing reads in that the 454 data does not provide individual base measurements from which </a:t>
+              <a:t>Example of extended CIGAR and the pileup output. (a) Alignments of one pair of reads and three single-end reads. (</a:t>
             </a:r>
             <a:r>
               <a:rPr lang="en-US" dirty="0" err="1" smtClean="0"/>
-              <a:t>basecalls</a:t>
-            </a:r>
-            <a:r>
-              <a:rPr lang="en-US" dirty="0" smtClean="0"/>
-              <a:t> can be derived. Instead, it provides measurements that estimate the length of the next </a:t>
+              <a:t>b</a:t>
+            </a:r>
+            <a:r>
+              <a:rPr lang="en-US" dirty="0" smtClean="0"/>
+              <a:t>) The corresponding SAM file. The ‘@SQ’ line in the header section gives the order of reference sequences. Notably, r001 is the name of a read pair. According to FLAG 163 (=1 + 2 + 32 + 128), the read mapped to position 7 is the second read in the pair (128) and regarded as properly paired (1 + 2); its mate is mapped to 37 on the reverse strand (32). Read r002 has three soft-clipped (unaligned) bases. The coordinate shown in SAM is the position of the first aligned base. The CIGAR string for this alignment contains a P (padding) operation which correctly aligns the inserted sequences. Padding operations can be absent when an aligner does not support multiple sequence alignment. The last six bases of read r003 map to position 9, and the first five to position 29 on the reverse strand. The hard clipping operation H indicates that the clipped sequence is not present in the sequence field. The NM tag gives the number of mismatches. Read r004 is aligned across an </a:t>
             </a:r>
             <a:r>
               <a:rPr lang="en-US" dirty="0" err="1" smtClean="0"/>
-              <a:t>homopolymer</a:t>
-            </a:r>
-            <a:r>
-              <a:rPr lang="en-US" dirty="0" smtClean="0"/>
-              <a:t> stretch in the sequence (i.e., in "AAATGG", "AAA" is a 3-mer stretch of A's, "T" is a 1-mer stretch of T's and "GG" is a 2-mer stretch of G's). A </a:t>
+              <a:t>intron</a:t>
+            </a:r>
+            <a:r>
+              <a:rPr lang="en-US" dirty="0" smtClean="0"/>
+              <a:t>, indicated by the N operation. (</a:t>
             </a:r>
             <a:r>
               <a:rPr lang="en-US" dirty="0" err="1" smtClean="0"/>
-              <a:t>basecalled</a:t>
-            </a:r>
-            <a:r>
-              <a:rPr lang="en-US" dirty="0" smtClean="0"/>
-              <a:t> sequence is then derived by converting each estimate into a </a:t>
+              <a:t>c</a:t>
+            </a:r>
+            <a:r>
+              <a:rPr lang="en-US" dirty="0" smtClean="0"/>
+              <a:t>) Simplified pileup output by </a:t>
             </a:r>
             <a:r>
               <a:rPr lang="en-US" dirty="0" err="1" smtClean="0"/>
-              <a:t>homopolymer</a:t>
-            </a:r>
-            <a:r>
-              <a:rPr lang="en-US" dirty="0" smtClean="0"/>
-              <a:t> stretch of that length and concatenating the </a:t>
-            </a:r>
-            <a:r>
-              <a:rPr lang="en-US" dirty="0" err="1" smtClean="0"/>
-              <a:t>homopolymers</a:t>
-            </a:r>
-            <a:r>
-              <a:rPr lang="en-US" dirty="0" smtClean="0"/>
-              <a:t>.</a:t>
+              <a:t>SAMtools</a:t>
+            </a:r>
+            <a:r>
+              <a:rPr lang="en-US" dirty="0" smtClean="0"/>
+              <a:t>. Each line consists of reference name, sorted coordinate, reference base, the number of reads covering the position and read bases. In the fifth field, a dot or a comma denotes a base identical to the reference; a dot or a capital letter denotes a base from a read mapped on the forward strand, while a comma or a lowercase letter on the reverse strand.</a:t>
             </a:r>
             <a:endParaRPr lang="en-US" dirty="0"/>
           </a:p>
@@ -906,7 +902,7 @@
             <a:fld id="{DC52FE66-5F38-224B-B84A-AC7B0050D720}" type="slidenum">
               <a:rPr lang="en-US" smtClean="0"/>
               <a:pPr/>
-              <a:t>9</a:t>
+              <a:t>10</a:t>
             </a:fld>
             <a:endParaRPr lang="en-US"/>
           </a:p>
@@ -921,7 +917,7 @@
 </file>
 
 <file path=ppt/notesSlides/notesSlide5.xml><?xml version="1.0" encoding="utf-8"?>
-<p:notes xmlns:a="http://schemas.openxmlformats.org/drawingml/2006/main" xmlns:r="http://schemas.openxmlformats.org/officeDocument/2006/relationships" xmlns:mc="http://schemas.openxmlformats.org/markup-compatibility/2006" xmlns:mv="urn:schemas-microsoft-com:mac:vml" xmlns:p="http://schemas.openxmlformats.org/presentationml/2006/main" mc:Ignorable="mv" mc:PreserveAttributes="mv:*">
+<p:notes xmlns:a="http://schemas.openxmlformats.org/drawingml/2006/main" xmlns:r="http://schemas.openxmlformats.org/officeDocument/2006/relationships" xmlns:p="http://schemas.openxmlformats.org/presentationml/2006/main">
   <p:cSld>
     <p:spTree>
       <p:nvGrpSpPr>
@@ -968,39 +964,53 @@
           <a:p>
             <a:r>
               <a:rPr lang="en-US" dirty="0" smtClean="0"/>
-              <a:t>Example of extended CIGAR and the pileup output. (a) Alignments of one pair of reads and three single-end reads. (</a:t>
-            </a:r>
+              <a:t>. (dot) means a base that matched the reference on the forward strand</a:t>
+            </a:r>
+          </a:p>
+          <a:p>
+            <a:r>
+              <a:rPr lang="en-US" dirty="0" smtClean="0"/>
+              <a:t>, (comma) means a base that matched the reference on the reverse strand</a:t>
+            </a:r>
+          </a:p>
+          <a:p>
+            <a:r>
+              <a:rPr lang="en-US" dirty="0" smtClean="0"/>
+              <a:t>AGTCN denotes a base that did not match the reference on the forward strand</a:t>
+            </a:r>
+          </a:p>
+          <a:p>
             <a:r>
               <a:rPr lang="en-US" dirty="0" err="1" smtClean="0"/>
-              <a:t>b</a:t>
-            </a:r>
-            <a:r>
-              <a:rPr lang="en-US" dirty="0" smtClean="0"/>
-              <a:t>) The corresponding SAM file. The ‘@SQ’ line in the header section gives the order of reference sequences. Notably, r001 is the name of a read pair. According to FLAG 163 (=1 + 2 + 32 + 128), the read mapped to position 7 is the second read in the pair (128) and regarded as properly paired (1 + 2); its mate is mapped to 37 on the reverse strand (32). Read r002 has three soft-clipped (unaligned) bases. The coordinate shown in SAM is the position of the first aligned base. The CIGAR string for this alignment contains a P (padding) operation which correctly aligns the inserted sequences. Padding operations can be absent when an aligner does not support multiple sequence alignment. The last six bases of read r003 map to position 9, and the first five to position 29 on the reverse strand. The hard clipping operation H indicates that the clipped sequence is not present in the sequence field. The NM tag gives the number of mismatches. Read r004 is aligned across an </a:t>
-            </a:r>
-            <a:r>
-              <a:rPr lang="en-US" dirty="0" err="1" smtClean="0"/>
-              <a:t>intron</a:t>
-            </a:r>
-            <a:r>
-              <a:rPr lang="en-US" dirty="0" smtClean="0"/>
-              <a:t>, indicated by the N operation. (</a:t>
-            </a:r>
-            <a:r>
-              <a:rPr lang="en-US" dirty="0" err="1" smtClean="0"/>
-              <a:t>c</a:t>
-            </a:r>
-            <a:r>
-              <a:rPr lang="en-US" dirty="0" smtClean="0"/>
-              <a:t>) Simplified pileup output by </a:t>
-            </a:r>
-            <a:r>
-              <a:rPr lang="en-US" dirty="0" err="1" smtClean="0"/>
-              <a:t>SAMtools</a:t>
-            </a:r>
-            <a:r>
-              <a:rPr lang="en-US" dirty="0" smtClean="0"/>
-              <a:t>. Each line consists of reference name, sorted coordinate, reference base, the number of reads covering the position and read bases. In the fifth field, a dot or a comma denotes a base identical to the reference; a dot or a capital letter denotes a base from a read mapped on the forward strand, while a comma or a lowercase letter on the reverse strand.</a:t>
+              <a:t>agtcn</a:t>
+            </a:r>
+            <a:r>
+              <a:rPr lang="en-US" dirty="0" smtClean="0"/>
+              <a:t> denotes a base that did not match the reference on the reverse strand</a:t>
+            </a:r>
+          </a:p>
+          <a:p>
+            <a:r>
+              <a:rPr lang="en-US" dirty="0" smtClean="0"/>
+              <a:t>+[0-9]+[ACGTNacgtn]+ denotes an insertion of one or more bases</a:t>
+            </a:r>
+          </a:p>
+          <a:p>
+            <a:r>
+              <a:rPr lang="en-US" dirty="0" smtClean="0"/>
+              <a:t>-[0-9]+[ACGTNacgtn]+ denotes a deletion of one or more bases</a:t>
+            </a:r>
+          </a:p>
+          <a:p>
+            <a:r>
+              <a:rPr lang="en-US" dirty="0" smtClean="0"/>
+              <a:t>^ (caret) marks the start of a read segment and the ASCII of the character following `^' minus 33 gives the mapping quality</a:t>
+            </a:r>
+          </a:p>
+          <a:p>
+            <a:r>
+              <a:rPr lang="en-US" dirty="0" smtClean="0"/>
+              <a:t>$ (dollar) marks the end of a read segment</a:t>
             </a:r>
             <a:endParaRPr lang="en-US" dirty="0"/>
           </a:p>
@@ -1039,7 +1049,7 @@
 </file>
 
 <file path=ppt/notesSlides/notesSlide6.xml><?xml version="1.0" encoding="utf-8"?>
-<p:notes xmlns:a="http://schemas.openxmlformats.org/drawingml/2006/main" xmlns:r="http://schemas.openxmlformats.org/officeDocument/2006/relationships" xmlns:mc="http://schemas.openxmlformats.org/markup-compatibility/2006" xmlns:mv="urn:schemas-microsoft-com:mac:vml" xmlns:p="http://schemas.openxmlformats.org/presentationml/2006/main" mc:Ignorable="mv" mc:PreserveAttributes="mv:*">
+<p:notes xmlns:a="http://schemas.openxmlformats.org/drawingml/2006/main" xmlns:r="http://schemas.openxmlformats.org/officeDocument/2006/relationships" xmlns:p="http://schemas.openxmlformats.org/presentationml/2006/main">
   <p:cSld>
     <p:spTree>
       <p:nvGrpSpPr>
@@ -1086,53 +1096,27 @@
           <a:p>
             <a:r>
               <a:rPr lang="en-US" dirty="0" smtClean="0"/>
-              <a:t>. (dot) means a base that matched the reference on the forward strand</a:t>
-            </a:r>
-          </a:p>
-          <a:p>
-            <a:r>
-              <a:rPr lang="en-US" dirty="0" smtClean="0"/>
-              <a:t>, (comma) means a base that matched the reference on the reverse strand</a:t>
-            </a:r>
-          </a:p>
-          <a:p>
-            <a:r>
-              <a:rPr lang="en-US" dirty="0" smtClean="0"/>
-              <a:t>AGTCN denotes a base that did not match the reference on the forward strand</a:t>
-            </a:r>
-          </a:p>
-          <a:p>
-            <a:r>
-              <a:rPr lang="en-US" dirty="0" err="1" smtClean="0"/>
-              <a:t>agtcn</a:t>
-            </a:r>
-            <a:r>
-              <a:rPr lang="en-US" dirty="0" smtClean="0"/>
-              <a:t> denotes a base that did not match the reference on the reverse strand</a:t>
-            </a:r>
-          </a:p>
-          <a:p>
-            <a:r>
-              <a:rPr lang="en-US" dirty="0" smtClean="0"/>
-              <a:t>+[0-9]+[ACGTNacgtn]+ denotes an insertion of one or more bases</a:t>
-            </a:r>
-          </a:p>
-          <a:p>
-            <a:r>
-              <a:rPr lang="en-US" dirty="0" smtClean="0"/>
-              <a:t>-[0-9]+[ACGTNacgtn]+ denotes a deletion of one or more bases</a:t>
-            </a:r>
-          </a:p>
-          <a:p>
-            <a:r>
-              <a:rPr lang="en-US" dirty="0" smtClean="0"/>
-              <a:t>^ (caret) marks the start of a read segment and the ASCII of the character following `^' minus 33 gives the mapping quality</a:t>
-            </a:r>
-          </a:p>
-          <a:p>
-            <a:r>
-              <a:rPr lang="en-US" dirty="0" smtClean="0"/>
-              <a:t>$ (dollar) marks the end of a read segment</a:t>
+              <a:t>For this exercise we will pick a set of the erroneous FASTQ</a:t>
+            </a:r>
+            <a:r>
+              <a:rPr lang="en-US" baseline="0" dirty="0" smtClean="0"/>
+              <a:t> sequences (in data/</a:t>
+            </a:r>
+            <a:r>
+              <a:rPr lang="en-US" baseline="0" dirty="0" err="1" smtClean="0"/>
+              <a:t>fastq</a:t>
+            </a:r>
+            <a:r>
+              <a:rPr lang="en-US" baseline="0" dirty="0" smtClean="0"/>
+              <a:t>), </a:t>
+            </a:r>
+            <a:r>
+              <a:rPr lang="en-US" baseline="0" dirty="0" err="1" smtClean="0"/>
+              <a:t>anonymize</a:t>
+            </a:r>
+            <a:r>
+              <a:rPr lang="en-US" baseline="0" dirty="0" smtClean="0"/>
+              <a:t> their names and have students diagnose what's wrong with them in a text editor. At this point we're still at the do-it-by-hand stage so this is an exercise in viewing plain text in an editor.</a:t>
             </a:r>
             <a:endParaRPr lang="en-US" dirty="0"/>
           </a:p>
@@ -1156,113 +1140,7 @@
             <a:fld id="{DC52FE66-5F38-224B-B84A-AC7B0050D720}" type="slidenum">
               <a:rPr lang="en-US" smtClean="0"/>
               <a:pPr/>
-              <a:t>12</a:t>
-            </a:fld>
-            <a:endParaRPr lang="en-US"/>
-          </a:p>
-        </p:txBody>
-      </p:sp>
-    </p:spTree>
-  </p:cSld>
-  <p:clrMapOvr>
-    <a:masterClrMapping/>
-  </p:clrMapOvr>
-</p:notes>
-</file>
-
-<file path=ppt/notesSlides/notesSlide7.xml><?xml version="1.0" encoding="utf-8"?>
-<p:notes xmlns:a="http://schemas.openxmlformats.org/drawingml/2006/main" xmlns:r="http://schemas.openxmlformats.org/officeDocument/2006/relationships" xmlns:mc="http://schemas.openxmlformats.org/markup-compatibility/2006" xmlns:mv="urn:schemas-microsoft-com:mac:vml" xmlns:p="http://schemas.openxmlformats.org/presentationml/2006/main" mc:Ignorable="mv" mc:PreserveAttributes="mv:*">
-  <p:cSld>
-    <p:spTree>
-      <p:nvGrpSpPr>
-        <p:cNvPr id="1" name=""/>
-        <p:cNvGrpSpPr/>
-        <p:nvPr/>
-      </p:nvGrpSpPr>
-      <p:grpSpPr>
-        <a:xfrm>
-          <a:off x="0" y="0"/>
-          <a:ext cx="0" cy="0"/>
-          <a:chOff x="0" y="0"/>
-          <a:chExt cx="0" cy="0"/>
-        </a:xfrm>
-      </p:grpSpPr>
-      <p:sp>
-        <p:nvSpPr>
-          <p:cNvPr id="2" name="Slide Image Placeholder 1"/>
-          <p:cNvSpPr>
-            <a:spLocks noGrp="1" noRot="1" noChangeAspect="1"/>
-          </p:cNvSpPr>
-          <p:nvPr>
-            <p:ph type="sldImg"/>
-          </p:nvPr>
-        </p:nvSpPr>
-        <p:spPr/>
-      </p:sp>
-      <p:sp>
-        <p:nvSpPr>
-          <p:cNvPr id="3" name="Notes Placeholder 2"/>
-          <p:cNvSpPr>
-            <a:spLocks noGrp="1"/>
-          </p:cNvSpPr>
-          <p:nvPr>
-            <p:ph type="body" idx="1"/>
-          </p:nvPr>
-        </p:nvSpPr>
-        <p:spPr/>
-        <p:txBody>
-          <a:bodyPr>
-            <a:normAutofit/>
-          </a:bodyPr>
-          <a:lstStyle/>
-          <a:p>
-            <a:r>
-              <a:rPr lang="en-US" dirty="0" smtClean="0"/>
-              <a:t>For this exercise we will pick a set of the erroneous FASTQ</a:t>
-            </a:r>
-            <a:r>
-              <a:rPr lang="en-US" baseline="0" dirty="0" smtClean="0"/>
-              <a:t> sequences (in data/</a:t>
-            </a:r>
-            <a:r>
-              <a:rPr lang="en-US" baseline="0" dirty="0" err="1" smtClean="0"/>
-              <a:t>fastq</a:t>
-            </a:r>
-            <a:r>
-              <a:rPr lang="en-US" baseline="0" dirty="0" smtClean="0"/>
-              <a:t>), </a:t>
-            </a:r>
-            <a:r>
-              <a:rPr lang="en-US" baseline="0" dirty="0" err="1" smtClean="0"/>
-              <a:t>anonymize</a:t>
-            </a:r>
-            <a:r>
-              <a:rPr lang="en-US" baseline="0" dirty="0" smtClean="0"/>
-              <a:t> their names and have students diagnose what's wrong with them in a text editor. At this point we're still at the do-it-by-hand stage so this is an exercise in viewing plain text in an editor.</a:t>
-            </a:r>
-            <a:endParaRPr lang="en-US" dirty="0"/>
-          </a:p>
-        </p:txBody>
-      </p:sp>
-      <p:sp>
-        <p:nvSpPr>
-          <p:cNvPr id="4" name="Slide Number Placeholder 3"/>
-          <p:cNvSpPr>
-            <a:spLocks noGrp="1"/>
-          </p:cNvSpPr>
-          <p:nvPr>
-            <p:ph type="sldNum" sz="quarter" idx="10"/>
-          </p:nvPr>
-        </p:nvSpPr>
-        <p:spPr/>
-        <p:txBody>
-          <a:bodyPr/>
-          <a:lstStyle/>
-          <a:p>
-            <a:fld id="{DC52FE66-5F38-224B-B84A-AC7B0050D720}" type="slidenum">
-              <a:rPr lang="en-US" smtClean="0"/>
-              <a:pPr/>
-              <a:t>14</a:t>
+              <a:t>13</a:t>
             </a:fld>
             <a:endParaRPr lang="en-US"/>
           </a:p>
@@ -1277,7 +1155,7 @@
 </file>
 
 <file path=ppt/slideLayouts/slideLayout1.xml><?xml version="1.0" encoding="utf-8"?>
-<p:sldLayout xmlns:a="http://schemas.openxmlformats.org/drawingml/2006/main" xmlns:r="http://schemas.openxmlformats.org/officeDocument/2006/relationships" xmlns:mc="http://schemas.openxmlformats.org/markup-compatibility/2006" xmlns:mv="urn:schemas-microsoft-com:mac:vml" xmlns:p="http://schemas.openxmlformats.org/presentationml/2006/main" mc:Ignorable="mv" mc:PreserveAttributes="mv:*" type="title" preserve="1">
+<p:sldLayout xmlns:a="http://schemas.openxmlformats.org/drawingml/2006/main" xmlns:r="http://schemas.openxmlformats.org/officeDocument/2006/relationships" xmlns:p="http://schemas.openxmlformats.org/presentationml/2006/main" type="title" preserve="1">
   <p:cSld name="Title Slide">
     <p:spTree>
       <p:nvGrpSpPr>
@@ -1458,7 +1336,7 @@
             <a:fld id="{4787E004-ACAC-BD41-B9FE-40E1A0F71FA8}" type="datetimeFigureOut">
               <a:rPr lang="en-US" smtClean="0"/>
               <a:pPr/>
-              <a:t>9/11/12</a:t>
+              <a:t>10/17/13</a:t>
             </a:fld>
             <a:endParaRPr lang="en-US"/>
           </a:p>
@@ -1501,7 +1379,7 @@
             <a:fld id="{86B16721-415B-5545-B8BF-CAE382F8416D}" type="slidenum">
               <a:rPr lang="en-US" smtClean="0"/>
               <a:pPr/>
-              <a:t>‹#›</a:t>
+              <a:t>‹nr.›</a:t>
             </a:fld>
             <a:endParaRPr lang="en-US"/>
           </a:p>
@@ -1516,7 +1394,7 @@
 </file>
 
 <file path=ppt/slideLayouts/slideLayout10.xml><?xml version="1.0" encoding="utf-8"?>
-<p:sldLayout xmlns:a="http://schemas.openxmlformats.org/drawingml/2006/main" xmlns:r="http://schemas.openxmlformats.org/officeDocument/2006/relationships" xmlns:mc="http://schemas.openxmlformats.org/markup-compatibility/2006" xmlns:mv="urn:schemas-microsoft-com:mac:vml" xmlns:p="http://schemas.openxmlformats.org/presentationml/2006/main" mc:Ignorable="mv" mc:PreserveAttributes="mv:*" type="vertTx" preserve="1">
+<p:sldLayout xmlns:a="http://schemas.openxmlformats.org/drawingml/2006/main" xmlns:r="http://schemas.openxmlformats.org/officeDocument/2006/relationships" xmlns:p="http://schemas.openxmlformats.org/presentationml/2006/main" type="vertTx" preserve="1">
   <p:cSld name="Title and Vertical Text">
     <p:spTree>
       <p:nvGrpSpPr>
@@ -1625,7 +1503,7 @@
             <a:fld id="{4787E004-ACAC-BD41-B9FE-40E1A0F71FA8}" type="datetimeFigureOut">
               <a:rPr lang="en-US" smtClean="0"/>
               <a:pPr/>
-              <a:t>9/11/12</a:t>
+              <a:t>10/17/13</a:t>
             </a:fld>
             <a:endParaRPr lang="en-US"/>
           </a:p>
@@ -1668,7 +1546,7 @@
             <a:fld id="{86B16721-415B-5545-B8BF-CAE382F8416D}" type="slidenum">
               <a:rPr lang="en-US" smtClean="0"/>
               <a:pPr/>
-              <a:t>‹#›</a:t>
+              <a:t>‹nr.›</a:t>
             </a:fld>
             <a:endParaRPr lang="en-US"/>
           </a:p>
@@ -1683,7 +1561,7 @@
 </file>
 
 <file path=ppt/slideLayouts/slideLayout11.xml><?xml version="1.0" encoding="utf-8"?>
-<p:sldLayout xmlns:a="http://schemas.openxmlformats.org/drawingml/2006/main" xmlns:r="http://schemas.openxmlformats.org/officeDocument/2006/relationships" xmlns:mc="http://schemas.openxmlformats.org/markup-compatibility/2006" xmlns:mv="urn:schemas-microsoft-com:mac:vml" xmlns:p="http://schemas.openxmlformats.org/presentationml/2006/main" mc:Ignorable="mv" mc:PreserveAttributes="mv:*" type="vertTitleAndTx" preserve="1">
+<p:sldLayout xmlns:a="http://schemas.openxmlformats.org/drawingml/2006/main" xmlns:r="http://schemas.openxmlformats.org/officeDocument/2006/relationships" xmlns:p="http://schemas.openxmlformats.org/presentationml/2006/main" type="vertTitleAndTx" preserve="1">
   <p:cSld name="Vertical Title and Text">
     <p:spTree>
       <p:nvGrpSpPr>
@@ -1802,7 +1680,7 @@
             <a:fld id="{4787E004-ACAC-BD41-B9FE-40E1A0F71FA8}" type="datetimeFigureOut">
               <a:rPr lang="en-US" smtClean="0"/>
               <a:pPr/>
-              <a:t>9/11/12</a:t>
+              <a:t>10/17/13</a:t>
             </a:fld>
             <a:endParaRPr lang="en-US"/>
           </a:p>
@@ -1845,7 +1723,7 @@
             <a:fld id="{86B16721-415B-5545-B8BF-CAE382F8416D}" type="slidenum">
               <a:rPr lang="en-US" smtClean="0"/>
               <a:pPr/>
-              <a:t>‹#›</a:t>
+              <a:t>‹nr.›</a:t>
             </a:fld>
             <a:endParaRPr lang="en-US"/>
           </a:p>
@@ -1860,7 +1738,7 @@
 </file>
 
 <file path=ppt/slideLayouts/slideLayout2.xml><?xml version="1.0" encoding="utf-8"?>
-<p:sldLayout xmlns:a="http://schemas.openxmlformats.org/drawingml/2006/main" xmlns:r="http://schemas.openxmlformats.org/officeDocument/2006/relationships" xmlns:mc="http://schemas.openxmlformats.org/markup-compatibility/2006" xmlns:mv="urn:schemas-microsoft-com:mac:vml" xmlns:p="http://schemas.openxmlformats.org/presentationml/2006/main" mc:Ignorable="mv" mc:PreserveAttributes="mv:*" type="obj" preserve="1">
+<p:sldLayout xmlns:a="http://schemas.openxmlformats.org/drawingml/2006/main" xmlns:r="http://schemas.openxmlformats.org/officeDocument/2006/relationships" xmlns:p="http://schemas.openxmlformats.org/presentationml/2006/main" type="obj" preserve="1">
   <p:cSld name="Title and Content">
     <p:spTree>
       <p:nvGrpSpPr>
@@ -1969,7 +1847,7 @@
             <a:fld id="{4787E004-ACAC-BD41-B9FE-40E1A0F71FA8}" type="datetimeFigureOut">
               <a:rPr lang="en-US" smtClean="0"/>
               <a:pPr/>
-              <a:t>9/11/12</a:t>
+              <a:t>10/17/13</a:t>
             </a:fld>
             <a:endParaRPr lang="en-US"/>
           </a:p>
@@ -2012,7 +1890,7 @@
             <a:fld id="{86B16721-415B-5545-B8BF-CAE382F8416D}" type="slidenum">
               <a:rPr lang="en-US" smtClean="0"/>
               <a:pPr/>
-              <a:t>‹#›</a:t>
+              <a:t>‹nr.›</a:t>
             </a:fld>
             <a:endParaRPr lang="en-US"/>
           </a:p>
@@ -2027,7 +1905,7 @@
 </file>
 
 <file path=ppt/slideLayouts/slideLayout3.xml><?xml version="1.0" encoding="utf-8"?>
-<p:sldLayout xmlns:a="http://schemas.openxmlformats.org/drawingml/2006/main" xmlns:r="http://schemas.openxmlformats.org/officeDocument/2006/relationships" xmlns:mc="http://schemas.openxmlformats.org/markup-compatibility/2006" xmlns:mv="urn:schemas-microsoft-com:mac:vml" xmlns:p="http://schemas.openxmlformats.org/presentationml/2006/main" mc:Ignorable="mv" mc:PreserveAttributes="mv:*" type="secHead" preserve="1">
+<p:sldLayout xmlns:a="http://schemas.openxmlformats.org/drawingml/2006/main" xmlns:r="http://schemas.openxmlformats.org/officeDocument/2006/relationships" xmlns:p="http://schemas.openxmlformats.org/presentationml/2006/main" type="secHead" preserve="1">
   <p:cSld name="Section Header">
     <p:spTree>
       <p:nvGrpSpPr>
@@ -2212,7 +2090,7 @@
             <a:fld id="{4787E004-ACAC-BD41-B9FE-40E1A0F71FA8}" type="datetimeFigureOut">
               <a:rPr lang="en-US" smtClean="0"/>
               <a:pPr/>
-              <a:t>9/11/12</a:t>
+              <a:t>10/17/13</a:t>
             </a:fld>
             <a:endParaRPr lang="en-US"/>
           </a:p>
@@ -2255,7 +2133,7 @@
             <a:fld id="{86B16721-415B-5545-B8BF-CAE382F8416D}" type="slidenum">
               <a:rPr lang="en-US" smtClean="0"/>
               <a:pPr/>
-              <a:t>‹#›</a:t>
+              <a:t>‹nr.›</a:t>
             </a:fld>
             <a:endParaRPr lang="en-US"/>
           </a:p>
@@ -2270,7 +2148,7 @@
 </file>
 
 <file path=ppt/slideLayouts/slideLayout4.xml><?xml version="1.0" encoding="utf-8"?>
-<p:sldLayout xmlns:a="http://schemas.openxmlformats.org/drawingml/2006/main" xmlns:r="http://schemas.openxmlformats.org/officeDocument/2006/relationships" xmlns:mc="http://schemas.openxmlformats.org/markup-compatibility/2006" xmlns:mv="urn:schemas-microsoft-com:mac:vml" xmlns:p="http://schemas.openxmlformats.org/presentationml/2006/main" mc:Ignorable="mv" mc:PreserveAttributes="mv:*" type="twoObj" preserve="1">
+<p:sldLayout xmlns:a="http://schemas.openxmlformats.org/drawingml/2006/main" xmlns:r="http://schemas.openxmlformats.org/officeDocument/2006/relationships" xmlns:p="http://schemas.openxmlformats.org/presentationml/2006/main" type="twoObj" preserve="1">
   <p:cSld name="Two Content">
     <p:spTree>
       <p:nvGrpSpPr>
@@ -2497,7 +2375,7 @@
             <a:fld id="{4787E004-ACAC-BD41-B9FE-40E1A0F71FA8}" type="datetimeFigureOut">
               <a:rPr lang="en-US" smtClean="0"/>
               <a:pPr/>
-              <a:t>9/11/12</a:t>
+              <a:t>10/17/13</a:t>
             </a:fld>
             <a:endParaRPr lang="en-US"/>
           </a:p>
@@ -2540,7 +2418,7 @@
             <a:fld id="{86B16721-415B-5545-B8BF-CAE382F8416D}" type="slidenum">
               <a:rPr lang="en-US" smtClean="0"/>
               <a:pPr/>
-              <a:t>‹#›</a:t>
+              <a:t>‹nr.›</a:t>
             </a:fld>
             <a:endParaRPr lang="en-US"/>
           </a:p>
@@ -2555,7 +2433,7 @@
 </file>
 
 <file path=ppt/slideLayouts/slideLayout5.xml><?xml version="1.0" encoding="utf-8"?>
-<p:sldLayout xmlns:a="http://schemas.openxmlformats.org/drawingml/2006/main" xmlns:r="http://schemas.openxmlformats.org/officeDocument/2006/relationships" xmlns:mc="http://schemas.openxmlformats.org/markup-compatibility/2006" xmlns:mv="urn:schemas-microsoft-com:mac:vml" xmlns:p="http://schemas.openxmlformats.org/presentationml/2006/main" mc:Ignorable="mv" mc:PreserveAttributes="mv:*" type="twoTxTwoObj" preserve="1">
+<p:sldLayout xmlns:a="http://schemas.openxmlformats.org/drawingml/2006/main" xmlns:r="http://schemas.openxmlformats.org/officeDocument/2006/relationships" xmlns:p="http://schemas.openxmlformats.org/presentationml/2006/main" type="twoTxTwoObj" preserve="1">
   <p:cSld name="Comparison">
     <p:spTree>
       <p:nvGrpSpPr>
@@ -2916,7 +2794,7 @@
             <a:fld id="{4787E004-ACAC-BD41-B9FE-40E1A0F71FA8}" type="datetimeFigureOut">
               <a:rPr lang="en-US" smtClean="0"/>
               <a:pPr/>
-              <a:t>9/11/12</a:t>
+              <a:t>10/17/13</a:t>
             </a:fld>
             <a:endParaRPr lang="en-US"/>
           </a:p>
@@ -2959,7 +2837,7 @@
             <a:fld id="{86B16721-415B-5545-B8BF-CAE382F8416D}" type="slidenum">
               <a:rPr lang="en-US" smtClean="0"/>
               <a:pPr/>
-              <a:t>‹#›</a:t>
+              <a:t>‹nr.›</a:t>
             </a:fld>
             <a:endParaRPr lang="en-US"/>
           </a:p>
@@ -2974,7 +2852,7 @@
 </file>
 
 <file path=ppt/slideLayouts/slideLayout6.xml><?xml version="1.0" encoding="utf-8"?>
-<p:sldLayout xmlns:a="http://schemas.openxmlformats.org/drawingml/2006/main" xmlns:r="http://schemas.openxmlformats.org/officeDocument/2006/relationships" xmlns:mc="http://schemas.openxmlformats.org/markup-compatibility/2006" xmlns:mv="urn:schemas-microsoft-com:mac:vml" xmlns:p="http://schemas.openxmlformats.org/presentationml/2006/main" mc:Ignorable="mv" mc:PreserveAttributes="mv:*" type="titleOnly" preserve="1">
+<p:sldLayout xmlns:a="http://schemas.openxmlformats.org/drawingml/2006/main" xmlns:r="http://schemas.openxmlformats.org/officeDocument/2006/relationships" xmlns:p="http://schemas.openxmlformats.org/presentationml/2006/main" type="titleOnly" preserve="1">
   <p:cSld name="Title Only">
     <p:spTree>
       <p:nvGrpSpPr>
@@ -3031,7 +2909,7 @@
             <a:fld id="{4787E004-ACAC-BD41-B9FE-40E1A0F71FA8}" type="datetimeFigureOut">
               <a:rPr lang="en-US" smtClean="0"/>
               <a:pPr/>
-              <a:t>9/11/12</a:t>
+              <a:t>10/17/13</a:t>
             </a:fld>
             <a:endParaRPr lang="en-US"/>
           </a:p>
@@ -3074,7 +2952,7 @@
             <a:fld id="{86B16721-415B-5545-B8BF-CAE382F8416D}" type="slidenum">
               <a:rPr lang="en-US" smtClean="0"/>
               <a:pPr/>
-              <a:t>‹#›</a:t>
+              <a:t>‹nr.›</a:t>
             </a:fld>
             <a:endParaRPr lang="en-US"/>
           </a:p>
@@ -3089,7 +2967,7 @@
 </file>
 
 <file path=ppt/slideLayouts/slideLayout7.xml><?xml version="1.0" encoding="utf-8"?>
-<p:sldLayout xmlns:a="http://schemas.openxmlformats.org/drawingml/2006/main" xmlns:r="http://schemas.openxmlformats.org/officeDocument/2006/relationships" xmlns:mc="http://schemas.openxmlformats.org/markup-compatibility/2006" xmlns:mv="urn:schemas-microsoft-com:mac:vml" xmlns:p="http://schemas.openxmlformats.org/presentationml/2006/main" mc:Ignorable="mv" mc:PreserveAttributes="mv:*" type="blank" preserve="1">
+<p:sldLayout xmlns:a="http://schemas.openxmlformats.org/drawingml/2006/main" xmlns:r="http://schemas.openxmlformats.org/officeDocument/2006/relationships" xmlns:p="http://schemas.openxmlformats.org/presentationml/2006/main" type="blank" preserve="1">
   <p:cSld name="Blank">
     <p:spTree>
       <p:nvGrpSpPr>
@@ -3123,7 +3001,7 @@
             <a:fld id="{4787E004-ACAC-BD41-B9FE-40E1A0F71FA8}" type="datetimeFigureOut">
               <a:rPr lang="en-US" smtClean="0"/>
               <a:pPr/>
-              <a:t>9/11/12</a:t>
+              <a:t>10/17/13</a:t>
             </a:fld>
             <a:endParaRPr lang="en-US"/>
           </a:p>
@@ -3166,7 +3044,7 @@
             <a:fld id="{86B16721-415B-5545-B8BF-CAE382F8416D}" type="slidenum">
               <a:rPr lang="en-US" smtClean="0"/>
               <a:pPr/>
-              <a:t>‹#›</a:t>
+              <a:t>‹nr.›</a:t>
             </a:fld>
             <a:endParaRPr lang="en-US"/>
           </a:p>
@@ -3181,7 +3059,7 @@
 </file>
 
 <file path=ppt/slideLayouts/slideLayout8.xml><?xml version="1.0" encoding="utf-8"?>
-<p:sldLayout xmlns:a="http://schemas.openxmlformats.org/drawingml/2006/main" xmlns:r="http://schemas.openxmlformats.org/officeDocument/2006/relationships" xmlns:mc="http://schemas.openxmlformats.org/markup-compatibility/2006" xmlns:mv="urn:schemas-microsoft-com:mac:vml" xmlns:p="http://schemas.openxmlformats.org/presentationml/2006/main" mc:Ignorable="mv" mc:PreserveAttributes="mv:*" type="objTx" preserve="1">
+<p:sldLayout xmlns:a="http://schemas.openxmlformats.org/drawingml/2006/main" xmlns:r="http://schemas.openxmlformats.org/officeDocument/2006/relationships" xmlns:p="http://schemas.openxmlformats.org/presentationml/2006/main" type="objTx" preserve="1">
   <p:cSld name="Content with Caption">
     <p:spTree>
       <p:nvGrpSpPr>
@@ -3397,7 +3275,7 @@
             <a:fld id="{4787E004-ACAC-BD41-B9FE-40E1A0F71FA8}" type="datetimeFigureOut">
               <a:rPr lang="en-US" smtClean="0"/>
               <a:pPr/>
-              <a:t>9/11/12</a:t>
+              <a:t>10/17/13</a:t>
             </a:fld>
             <a:endParaRPr lang="en-US"/>
           </a:p>
@@ -3440,7 +3318,7 @@
             <a:fld id="{86B16721-415B-5545-B8BF-CAE382F8416D}" type="slidenum">
               <a:rPr lang="en-US" smtClean="0"/>
               <a:pPr/>
-              <a:t>‹#›</a:t>
+              <a:t>‹nr.›</a:t>
             </a:fld>
             <a:endParaRPr lang="en-US"/>
           </a:p>
@@ -3455,7 +3333,7 @@
 </file>
 
 <file path=ppt/slideLayouts/slideLayout9.xml><?xml version="1.0" encoding="utf-8"?>
-<p:sldLayout xmlns:a="http://schemas.openxmlformats.org/drawingml/2006/main" xmlns:r="http://schemas.openxmlformats.org/officeDocument/2006/relationships" xmlns:mc="http://schemas.openxmlformats.org/markup-compatibility/2006" xmlns:mv="urn:schemas-microsoft-com:mac:vml" xmlns:p="http://schemas.openxmlformats.org/presentationml/2006/main" mc:Ignorable="mv" mc:PreserveAttributes="mv:*" type="picTx" preserve="1">
+<p:sldLayout xmlns:a="http://schemas.openxmlformats.org/drawingml/2006/main" xmlns:r="http://schemas.openxmlformats.org/officeDocument/2006/relationships" xmlns:p="http://schemas.openxmlformats.org/presentationml/2006/main" type="picTx" preserve="1">
   <p:cSld name="Picture with Caption">
     <p:spTree>
       <p:nvGrpSpPr>
@@ -3647,7 +3525,7 @@
             <a:fld id="{4787E004-ACAC-BD41-B9FE-40E1A0F71FA8}" type="datetimeFigureOut">
               <a:rPr lang="en-US" smtClean="0"/>
               <a:pPr/>
-              <a:t>9/11/12</a:t>
+              <a:t>10/17/13</a:t>
             </a:fld>
             <a:endParaRPr lang="en-US"/>
           </a:p>
@@ -3690,7 +3568,7 @@
             <a:fld id="{86B16721-415B-5545-B8BF-CAE382F8416D}" type="slidenum">
               <a:rPr lang="en-US" smtClean="0"/>
               <a:pPr/>
-              <a:t>‹#›</a:t>
+              <a:t>‹nr.›</a:t>
             </a:fld>
             <a:endParaRPr lang="en-US"/>
           </a:p>
@@ -3705,7 +3583,7 @@
 </file>
 
 <file path=ppt/slideMasters/slideMaster1.xml><?xml version="1.0" encoding="utf-8"?>
-<p:sldMaster xmlns:a="http://schemas.openxmlformats.org/drawingml/2006/main" xmlns:r="http://schemas.openxmlformats.org/officeDocument/2006/relationships" xmlns:mc="http://schemas.openxmlformats.org/markup-compatibility/2006" xmlns:mv="urn:schemas-microsoft-com:mac:vml" xmlns:p="http://schemas.openxmlformats.org/presentationml/2006/main" mc:Ignorable="mv" mc:PreserveAttributes="mv:*">
+<p:sldMaster xmlns:a="http://schemas.openxmlformats.org/drawingml/2006/main" xmlns:r="http://schemas.openxmlformats.org/officeDocument/2006/relationships" xmlns:p="http://schemas.openxmlformats.org/presentationml/2006/main">
   <p:cSld>
     <p:bg>
       <p:bgRef idx="1001">
@@ -3857,7 +3735,7 @@
             <a:fld id="{4787E004-ACAC-BD41-B9FE-40E1A0F71FA8}" type="datetimeFigureOut">
               <a:rPr lang="en-US" smtClean="0"/>
               <a:pPr/>
-              <a:t>9/11/12</a:t>
+              <a:t>10/17/13</a:t>
             </a:fld>
             <a:endParaRPr lang="en-US"/>
           </a:p>
@@ -3936,7 +3814,7 @@
             <a:fld id="{86B16721-415B-5545-B8BF-CAE382F8416D}" type="slidenum">
               <a:rPr lang="en-US" smtClean="0"/>
               <a:pPr/>
-              <a:t>‹#›</a:t>
+              <a:t>‹nr.›</a:t>
             </a:fld>
             <a:endParaRPr lang="en-US"/>
           </a:p>
@@ -4212,7 +4090,7 @@
 </file>
 
 <file path=ppt/slides/slide1.xml><?xml version="1.0" encoding="utf-8"?>
-<p:sld xmlns:a="http://schemas.openxmlformats.org/drawingml/2006/main" xmlns:r="http://schemas.openxmlformats.org/officeDocument/2006/relationships" xmlns:mc="http://schemas.openxmlformats.org/markup-compatibility/2006" xmlns:mv="urn:schemas-microsoft-com:mac:vml" xmlns:p="http://schemas.openxmlformats.org/presentationml/2006/main" mc:Ignorable="mv" mc:PreserveAttributes="mv:*">
+<p:sld xmlns:a="http://schemas.openxmlformats.org/drawingml/2006/main" xmlns:r="http://schemas.openxmlformats.org/officeDocument/2006/relationships" xmlns:p="http://schemas.openxmlformats.org/presentationml/2006/main">
   <p:cSld>
     <p:spTree>
       <p:nvGrpSpPr>
@@ -4266,18 +4144,6 @@
           <a:bodyPr/>
           <a:lstStyle/>
           <a:p>
-            <a:r>
-              <a:rPr lang="en-US" dirty="0" smtClean="0"/>
-              <a:t>11 September 2012, </a:t>
-            </a:r>
-            <a:r>
-              <a:rPr lang="en-US" dirty="0" smtClean="0"/>
-              <a:t>11.30</a:t>
-            </a:r>
-            <a:r>
-              <a:rPr lang="en-US" dirty="0" smtClean="0"/>
-              <a:t>-12.30</a:t>
-            </a:r>
             <a:endParaRPr lang="en-US" dirty="0"/>
           </a:p>
         </p:txBody>
@@ -4290,7 +4156,7 @@
   <p:timing>
     <p:tnLst>
       <p:par>
-        <p:cTn id="1" dur="indefinite" restart="never" nodeType="tmRoot"/>
+        <p:cTn xmlns:p14="http://schemas.microsoft.com/office/powerpoint/2010/main" id="1" dur="indefinite" restart="never" nodeType="tmRoot"/>
       </p:par>
     </p:tnLst>
   </p:timing>
@@ -4298,7 +4164,7 @@
 </file>
 
 <file path=ppt/slides/slide10.xml><?xml version="1.0" encoding="utf-8"?>
-<p:sld xmlns:a="http://schemas.openxmlformats.org/drawingml/2006/main" xmlns:r="http://schemas.openxmlformats.org/officeDocument/2006/relationships" xmlns:mc="http://schemas.openxmlformats.org/markup-compatibility/2006" xmlns:mv="urn:schemas-microsoft-com:mac:vml" xmlns:p="http://schemas.openxmlformats.org/presentationml/2006/main" mc:Ignorable="mv" mc:PreserveAttributes="mv:*">
+<p:sld xmlns:a="http://schemas.openxmlformats.org/drawingml/2006/main" xmlns:r="http://schemas.openxmlformats.org/officeDocument/2006/relationships" xmlns:p="http://schemas.openxmlformats.org/presentationml/2006/main">
   <p:cSld>
     <p:spTree>
       <p:nvGrpSpPr>
@@ -4316,7 +4182,7 @@
       </p:grpSpPr>
       <p:sp>
         <p:nvSpPr>
-          <p:cNvPr id="2" name="Title 1"/>
+          <p:cNvPr id="5" name="Title 4"/>
           <p:cNvSpPr>
             <a:spLocks noGrp="1"/>
           </p:cNvSpPr>
@@ -4331,67 +4197,31 @@
           <a:p>
             <a:r>
               <a:rPr lang="en-US" dirty="0" smtClean="0"/>
-              <a:t>SAM/BAM</a:t>
+              <a:t>SAM/BAM format</a:t>
             </a:r>
             <a:endParaRPr lang="en-US" dirty="0"/>
           </a:p>
         </p:txBody>
       </p:sp>
-      <p:sp>
-        <p:nvSpPr>
-          <p:cNvPr id="5" name="Content Placeholder 4"/>
-          <p:cNvSpPr>
-            <a:spLocks noGrp="1"/>
-          </p:cNvSpPr>
+      <p:pic>
+        <p:nvPicPr>
+          <p:cNvPr id="7" name="Content Placeholder 6" descr="samtools.gif"/>
+          <p:cNvPicPr>
+            <a:picLocks noGrp="1" noChangeAspect="1"/>
+          </p:cNvPicPr>
           <p:nvPr>
             <p:ph idx="1"/>
           </p:nvPr>
-        </p:nvSpPr>
-        <p:spPr/>
-        <p:txBody>
-          <a:bodyPr/>
-          <a:lstStyle/>
-          <a:p>
-            <a:r>
-              <a:rPr lang="en-US" dirty="0" smtClean="0"/>
-              <a:t>Encodes reads aligned to a reference sequence</a:t>
-            </a:r>
-          </a:p>
-          <a:p>
-            <a:r>
-              <a:rPr lang="en-US" dirty="0" smtClean="0"/>
-              <a:t>Textual (SAM) and binary representations (BAM)</a:t>
-            </a:r>
-          </a:p>
-          <a:p>
-            <a:r>
-              <a:rPr lang="en-US" dirty="0" err="1" smtClean="0"/>
-              <a:t>Samtools</a:t>
-            </a:r>
-            <a:r>
-              <a:rPr lang="en-US" dirty="0" smtClean="0"/>
-              <a:t>, </a:t>
-            </a:r>
-            <a:r>
-              <a:rPr lang="en-US" dirty="0" err="1" smtClean="0"/>
-              <a:t>picard</a:t>
-            </a:r>
-            <a:r>
-              <a:rPr lang="en-US" dirty="0" smtClean="0"/>
-              <a:t>, EMBOSS, (</a:t>
-            </a:r>
-            <a:r>
-              <a:rPr lang="en-US" dirty="0" err="1" smtClean="0"/>
-              <a:t>Bio::SamTools</a:t>
-            </a:r>
-            <a:r>
-              <a:rPr lang="en-US" dirty="0" smtClean="0"/>
-              <a:t>, Galaxy)</a:t>
-            </a:r>
-            <a:endParaRPr lang="en-US" dirty="0"/>
-          </a:p>
-        </p:txBody>
-      </p:sp>
+        </p:nvPicPr>
+        <p:blipFill>
+          <a:blip r:embed="rId3"/>
+          <a:srcRect l="-22908" r="-22908"/>
+          <a:stretch>
+            <a:fillRect/>
+          </a:stretch>
+        </p:blipFill>
+        <p:spPr/>
+      </p:pic>
     </p:spTree>
   </p:cSld>
   <p:clrMapOvr>
@@ -4400,7 +4230,7 @@
   <p:timing>
     <p:tnLst>
       <p:par>
-        <p:cTn id="1" dur="indefinite" restart="never" nodeType="tmRoot"/>
+        <p:cTn xmlns:p14="http://schemas.microsoft.com/office/powerpoint/2010/main" id="1" dur="indefinite" restart="never" nodeType="tmRoot"/>
       </p:par>
     </p:tnLst>
   </p:timing>
@@ -4408,7 +4238,7 @@
 </file>
 
 <file path=ppt/slides/slide11.xml><?xml version="1.0" encoding="utf-8"?>
-<p:sld xmlns:a="http://schemas.openxmlformats.org/drawingml/2006/main" xmlns:r="http://schemas.openxmlformats.org/officeDocument/2006/relationships" xmlns:mc="http://schemas.openxmlformats.org/markup-compatibility/2006" xmlns:mv="urn:schemas-microsoft-com:mac:vml" xmlns:p="http://schemas.openxmlformats.org/presentationml/2006/main" mc:Ignorable="mv" mc:PreserveAttributes="mv:*">
+<p:sld xmlns:a="http://schemas.openxmlformats.org/drawingml/2006/main" xmlns:r="http://schemas.openxmlformats.org/officeDocument/2006/relationships" xmlns:p="http://schemas.openxmlformats.org/presentationml/2006/main">
   <p:cSld>
     <p:spTree>
       <p:nvGrpSpPr>
@@ -4426,7 +4256,7 @@
       </p:grpSpPr>
       <p:sp>
         <p:nvSpPr>
-          <p:cNvPr id="5" name="Title 4"/>
+          <p:cNvPr id="2" name="Title 1"/>
           <p:cNvSpPr>
             <a:spLocks noGrp="1"/>
           </p:cNvSpPr>
@@ -4441,31 +4271,200 @@
           <a:p>
             <a:r>
               <a:rPr lang="en-US" dirty="0" smtClean="0"/>
-              <a:t>SAM/BAM format</a:t>
+              <a:t>Pileup</a:t>
             </a:r>
             <a:endParaRPr lang="en-US" dirty="0"/>
           </a:p>
         </p:txBody>
       </p:sp>
-      <p:pic>
-        <p:nvPicPr>
-          <p:cNvPr id="7" name="Content Placeholder 6" descr="samtools.gif"/>
-          <p:cNvPicPr>
-            <a:picLocks noGrp="1" noChangeAspect="1"/>
-          </p:cNvPicPr>
+      <p:sp>
+        <p:nvSpPr>
+          <p:cNvPr id="3" name="Content Placeholder 2"/>
+          <p:cNvSpPr>
+            <a:spLocks noGrp="1"/>
+          </p:cNvSpPr>
           <p:nvPr>
             <p:ph idx="1"/>
           </p:nvPr>
-        </p:nvPicPr>
-        <p:blipFill>
-          <a:blip r:embed="rId3"/>
-          <a:srcRect l="-22908" r="-22908"/>
-          <a:stretch>
-            <a:fillRect/>
-          </a:stretch>
-        </p:blipFill>
-        <p:spPr/>
-      </p:pic>
+        </p:nvSpPr>
+        <p:spPr/>
+        <p:txBody>
+          <a:bodyPr>
+            <a:normAutofit/>
+          </a:bodyPr>
+          <a:lstStyle/>
+          <a:p>
+            <a:pPr>
+              <a:buNone/>
+            </a:pPr>
+            <a:r>
+              <a:rPr lang="en-US" sz="1500" b="1" dirty="0" smtClean="0">
+                <a:latin typeface="Courier New"/>
+                <a:cs typeface="Courier New"/>
+              </a:rPr>
+              <a:t>seq1 272 T 24  ,.$.....,,.,.,...,,,.,..^+. &lt;&lt;&lt;+;&lt;&lt;&lt;&lt;&lt;&lt;&lt;&lt;&lt;&lt;&lt;=&lt;;&lt;;7&lt;&amp;</a:t>
+            </a:r>
+          </a:p>
+          <a:p>
+            <a:pPr>
+              <a:buNone/>
+            </a:pPr>
+            <a:r>
+              <a:rPr lang="en-US" sz="1500" b="1" dirty="0" smtClean="0">
+                <a:latin typeface="Courier New"/>
+                <a:cs typeface="Courier New"/>
+              </a:rPr>
+              <a:t>seq1 273 T 23  ,.....,,.,.,...,,,.,..A &lt;&lt;&lt;;&lt;&lt;&lt;&lt;&lt;&lt;&lt;&lt;&lt;3&lt;=&lt;&lt;&lt;;&lt;&lt;+</a:t>
+            </a:r>
+          </a:p>
+          <a:p>
+            <a:pPr>
+              <a:buNone/>
+            </a:pPr>
+            <a:r>
+              <a:rPr lang="en-US" sz="1500" b="1" dirty="0" smtClean="0">
+                <a:latin typeface="Courier New"/>
+                <a:cs typeface="Courier New"/>
+              </a:rPr>
+              <a:t>seq1 274 T 23  ,.$....,,.,.,...,,,.,...    7&lt;7;&lt;;&lt;&lt;&lt;&lt;&lt;&lt;&lt;&lt;&lt;=&lt;;&lt;;&lt;&lt;6</a:t>
+            </a:r>
+          </a:p>
+          <a:p>
+            <a:pPr>
+              <a:buNone/>
+            </a:pPr>
+            <a:r>
+              <a:rPr lang="en-US" sz="1500" b="1" dirty="0" smtClean="0">
+                <a:latin typeface="Courier New"/>
+                <a:cs typeface="Courier New"/>
+              </a:rPr>
+              <a:t>seq1 275 A 23  ,$....,,.,.,...,,,.,...^</a:t>
+            </a:r>
+            <a:r>
+              <a:rPr lang="en-US" sz="1500" b="1" dirty="0" err="1" smtClean="0">
+                <a:latin typeface="Courier New"/>
+                <a:cs typeface="Courier New"/>
+              </a:rPr>
+              <a:t>l</a:t>
+            </a:r>
+            <a:r>
+              <a:rPr lang="en-US" sz="1500" b="1" dirty="0" smtClean="0">
+                <a:latin typeface="Courier New"/>
+                <a:cs typeface="Courier New"/>
+              </a:rPr>
+              <a:t>.  &lt;+;9*&lt;&lt;&lt;&lt;&lt;&lt;&lt;&lt;&lt;=&lt;&lt;:;&lt;&lt;&lt;&lt;</a:t>
+            </a:r>
+          </a:p>
+          <a:p>
+            <a:pPr>
+              <a:buNone/>
+            </a:pPr>
+            <a:r>
+              <a:rPr lang="en-US" sz="1500" b="1" dirty="0" smtClean="0">
+                <a:latin typeface="Courier New"/>
+                <a:cs typeface="Courier New"/>
+              </a:rPr>
+              <a:t>seq1 276 G 22  ...T,,.,.,...,,,.,....  33;+&lt;&lt;7=7&lt;&lt;7&lt;&amp;&lt;&lt;1;&lt;&lt;6&lt;</a:t>
+            </a:r>
+          </a:p>
+          <a:p>
+            <a:pPr>
+              <a:buNone/>
+            </a:pPr>
+            <a:r>
+              <a:rPr lang="en-US" sz="1500" b="1" dirty="0" smtClean="0">
+                <a:latin typeface="Courier New"/>
+                <a:cs typeface="Courier New"/>
+              </a:rPr>
+              <a:t>seq1 277 T 22  ....,,.,.,.C.,,,.,..G.  +7&lt;;&lt;&lt;&lt;&lt;&lt;&lt;&lt;&amp;&lt;=&lt;&lt;:;&lt;&lt;&amp;&lt;</a:t>
+            </a:r>
+          </a:p>
+          <a:p>
+            <a:pPr>
+              <a:buNone/>
+            </a:pPr>
+            <a:endParaRPr lang="en-US" sz="1500" b="1" dirty="0" smtClean="0">
+              <a:latin typeface="Courier New"/>
+              <a:cs typeface="Courier New"/>
+            </a:endParaRPr>
+          </a:p>
+          <a:p>
+            <a:pPr marL="514350" indent="-514350">
+              <a:buFont typeface="+mj-lt"/>
+              <a:buAutoNum type="arabicPeriod"/>
+            </a:pPr>
+            <a:r>
+              <a:rPr lang="en-US" sz="2162" dirty="0" smtClean="0">
+                <a:cs typeface="Courier New"/>
+              </a:rPr>
+              <a:t>Sequence identifier</a:t>
+            </a:r>
+          </a:p>
+          <a:p>
+            <a:pPr marL="514350" indent="-514350">
+              <a:buFont typeface="+mj-lt"/>
+              <a:buAutoNum type="arabicPeriod"/>
+            </a:pPr>
+            <a:r>
+              <a:rPr lang="en-US" sz="2162" dirty="0" smtClean="0">
+                <a:cs typeface="Courier New"/>
+              </a:rPr>
+              <a:t>Position in sequence (starting from 1)</a:t>
+            </a:r>
+          </a:p>
+          <a:p>
+            <a:pPr marL="514350" indent="-514350">
+              <a:buFont typeface="+mj-lt"/>
+              <a:buAutoNum type="arabicPeriod"/>
+            </a:pPr>
+            <a:r>
+              <a:rPr lang="en-US" sz="2162" dirty="0" smtClean="0">
+                <a:cs typeface="Courier New"/>
+              </a:rPr>
+              <a:t>Nucleotide at that position</a:t>
+            </a:r>
+          </a:p>
+          <a:p>
+            <a:pPr marL="514350" indent="-514350">
+              <a:buFont typeface="+mj-lt"/>
+              <a:buAutoNum type="arabicPeriod"/>
+            </a:pPr>
+            <a:r>
+              <a:rPr lang="en-US" sz="2162" dirty="0" smtClean="0">
+                <a:cs typeface="Courier New"/>
+              </a:rPr>
+              <a:t>Number of aligned reads covering that position (depth of coverage)</a:t>
+            </a:r>
+          </a:p>
+          <a:p>
+            <a:pPr marL="514350" indent="-514350">
+              <a:buFont typeface="+mj-lt"/>
+              <a:buAutoNum type="arabicPeriod"/>
+            </a:pPr>
+            <a:r>
+              <a:rPr lang="en-US" sz="2162" dirty="0" smtClean="0">
+                <a:cs typeface="Courier New"/>
+              </a:rPr>
+              <a:t>Bases at that position from aligned reads</a:t>
+            </a:r>
+          </a:p>
+          <a:p>
+            <a:pPr marL="514350" indent="-514350">
+              <a:buFont typeface="+mj-lt"/>
+              <a:buAutoNum type="arabicPeriod"/>
+            </a:pPr>
+            <a:r>
+              <a:rPr lang="en-US" sz="2162" dirty="0" smtClean="0">
+                <a:cs typeface="Courier New"/>
+              </a:rPr>
+              <a:t>Mapping quality of those bases (OPTIONAL)</a:t>
+            </a:r>
+            <a:endParaRPr lang="en-US" dirty="0">
+              <a:cs typeface="Courier New"/>
+            </a:endParaRPr>
+          </a:p>
+        </p:txBody>
+      </p:sp>
     </p:spTree>
   </p:cSld>
   <p:clrMapOvr>
@@ -4474,7 +4473,7 @@
   <p:timing>
     <p:tnLst>
       <p:par>
-        <p:cTn id="1" dur="indefinite" restart="never" nodeType="tmRoot"/>
+        <p:cTn xmlns:p14="http://schemas.microsoft.com/office/powerpoint/2010/main" id="1" dur="indefinite" restart="never" nodeType="tmRoot"/>
       </p:par>
     </p:tnLst>
   </p:timing>
@@ -4482,7 +4481,7 @@
 </file>
 
 <file path=ppt/slides/slide12.xml><?xml version="1.0" encoding="utf-8"?>
-<p:sld xmlns:a="http://schemas.openxmlformats.org/drawingml/2006/main" xmlns:r="http://schemas.openxmlformats.org/officeDocument/2006/relationships" xmlns:mc="http://schemas.openxmlformats.org/markup-compatibility/2006" xmlns:mv="urn:schemas-microsoft-com:mac:vml" xmlns:p="http://schemas.openxmlformats.org/presentationml/2006/main" mc:Ignorable="mv" mc:PreserveAttributes="mv:*">
+<p:sld xmlns:a="http://schemas.openxmlformats.org/drawingml/2006/main" xmlns:r="http://schemas.openxmlformats.org/officeDocument/2006/relationships" xmlns:p="http://schemas.openxmlformats.org/presentationml/2006/main">
   <p:cSld>
     <p:spTree>
       <p:nvGrpSpPr>
@@ -4515,7 +4514,7 @@
           <a:p>
             <a:r>
               <a:rPr lang="en-US" dirty="0" smtClean="0"/>
-              <a:t>Pileup</a:t>
+              <a:t>Tabular annotation files</a:t>
             </a:r>
             <a:endParaRPr lang="en-US" dirty="0"/>
           </a:p>
@@ -4533,179 +4532,52 @@
         </p:nvSpPr>
         <p:spPr/>
         <p:txBody>
-          <a:bodyPr>
-            <a:normAutofit/>
-          </a:bodyPr>
-          <a:lstStyle/>
-          <a:p>
-            <a:pPr>
-              <a:buNone/>
-            </a:pPr>
-            <a:r>
-              <a:rPr lang="en-US" sz="1500" b="1" dirty="0" smtClean="0">
-                <a:latin typeface="Courier New"/>
-                <a:cs typeface="Courier New"/>
-              </a:rPr>
-              <a:t>seq1 272 T 24  ,.$.....,,.,.,...,,,.,..^+. &lt;&lt;&lt;+;&lt;&lt;&lt;&lt;&lt;&lt;&lt;&lt;&lt;&lt;&lt;=&lt;;&lt;;7&lt;&amp;</a:t>
-            </a:r>
-          </a:p>
-          <a:p>
-            <a:pPr>
-              <a:buNone/>
-            </a:pPr>
-            <a:r>
-              <a:rPr lang="en-US" sz="1500" b="1" dirty="0" smtClean="0">
-                <a:latin typeface="Courier New"/>
-                <a:cs typeface="Courier New"/>
-              </a:rPr>
-              <a:t>seq1 273 T 23  ,.....,,.,.,...,,,.,..A &lt;&lt;&lt;;&lt;&lt;&lt;&lt;&lt;&lt;&lt;&lt;&lt;3&lt;=&lt;&lt;&lt;;&lt;&lt;+</a:t>
-            </a:r>
-          </a:p>
-          <a:p>
-            <a:pPr>
-              <a:buNone/>
-            </a:pPr>
-            <a:r>
-              <a:rPr lang="en-US" sz="1500" b="1" dirty="0" smtClean="0">
-                <a:latin typeface="Courier New"/>
-                <a:cs typeface="Courier New"/>
-              </a:rPr>
-              <a:t>seq1 274 T 23  ,.$....,,.,.,...,,,.,...    7&lt;7;&lt;;&lt;&lt;&lt;&lt;&lt;&lt;&lt;&lt;&lt;=&lt;;&lt;;&lt;&lt;6</a:t>
-            </a:r>
-          </a:p>
-          <a:p>
-            <a:pPr>
-              <a:buNone/>
-            </a:pPr>
-            <a:r>
-              <a:rPr lang="en-US" sz="1500" b="1" dirty="0" smtClean="0">
-                <a:latin typeface="Courier New"/>
-                <a:cs typeface="Courier New"/>
-              </a:rPr>
-              <a:t>seq1 275 A 23  ,$....,,.,.,...,,,.,...^</a:t>
-            </a:r>
-            <a:r>
-              <a:rPr lang="en-US" sz="1500" b="1" dirty="0" err="1" smtClean="0">
-                <a:latin typeface="Courier New"/>
-                <a:cs typeface="Courier New"/>
-              </a:rPr>
-              <a:t>l</a:t>
-            </a:r>
-            <a:r>
-              <a:rPr lang="en-US" sz="1500" b="1" dirty="0" smtClean="0">
-                <a:latin typeface="Courier New"/>
-                <a:cs typeface="Courier New"/>
-              </a:rPr>
-              <a:t>.  &lt;+;9*&lt;&lt;&lt;&lt;&lt;&lt;&lt;&lt;&lt;=&lt;&lt;:;&lt;&lt;&lt;&lt;</a:t>
-            </a:r>
-          </a:p>
-          <a:p>
-            <a:pPr>
-              <a:buNone/>
-            </a:pPr>
-            <a:r>
-              <a:rPr lang="en-US" sz="1500" b="1" dirty="0" smtClean="0">
-                <a:latin typeface="Courier New"/>
-                <a:cs typeface="Courier New"/>
-              </a:rPr>
-              <a:t>seq1 276 G 22  ...T,,.,.,...,,,.,....  33;+&lt;&lt;7=7&lt;&lt;7&lt;&amp;&lt;&lt;1;&lt;&lt;6&lt;</a:t>
-            </a:r>
-          </a:p>
-          <a:p>
-            <a:pPr>
-              <a:buNone/>
-            </a:pPr>
-            <a:r>
-              <a:rPr lang="en-US" sz="1500" b="1" dirty="0" smtClean="0">
-                <a:latin typeface="Courier New"/>
-                <a:cs typeface="Courier New"/>
-              </a:rPr>
-              <a:t>seq1 277 T 22  ....,,.,.,.C.,,,.,..G.  +7&lt;;&lt;&lt;&lt;&lt;&lt;&lt;&lt;&amp;&lt;=&lt;&lt;:;&lt;&lt;&amp;&lt;</a:t>
-            </a:r>
-          </a:p>
-          <a:p>
-            <a:pPr>
-              <a:buNone/>
-            </a:pPr>
-            <a:endParaRPr lang="en-US" sz="1500" b="1" dirty="0" smtClean="0">
-              <a:latin typeface="Courier New"/>
-              <a:cs typeface="Courier New"/>
-            </a:endParaRPr>
-          </a:p>
-          <a:p>
-            <a:pPr marL="514350" indent="-514350">
-              <a:buFont typeface="+mj-lt"/>
-              <a:buAutoNum type="arabicPeriod"/>
-            </a:pPr>
-            <a:r>
-              <a:rPr lang="en-US" sz="2162" dirty="0" smtClean="0">
-                <a:cs typeface="Courier New"/>
-              </a:rPr>
-              <a:t>Sequence identifier</a:t>
-            </a:r>
-          </a:p>
-          <a:p>
-            <a:pPr marL="514350" indent="-514350">
-              <a:buFont typeface="+mj-lt"/>
-              <a:buAutoNum type="arabicPeriod"/>
-            </a:pPr>
-            <a:r>
-              <a:rPr lang="en-US" sz="2162" dirty="0" smtClean="0">
-                <a:cs typeface="Courier New"/>
-              </a:rPr>
-              <a:t>Position in sequence (starting from 1)</a:t>
-            </a:r>
-          </a:p>
-          <a:p>
-            <a:pPr marL="514350" indent="-514350">
-              <a:buFont typeface="+mj-lt"/>
-              <a:buAutoNum type="arabicPeriod"/>
-            </a:pPr>
-            <a:r>
-              <a:rPr lang="en-US" sz="2162" dirty="0" smtClean="0">
-                <a:cs typeface="Courier New"/>
-              </a:rPr>
-              <a:t>Nucleotide at that position</a:t>
-            </a:r>
-          </a:p>
-          <a:p>
-            <a:pPr marL="514350" indent="-514350">
-              <a:buFont typeface="+mj-lt"/>
-              <a:buAutoNum type="arabicPeriod"/>
-            </a:pPr>
-            <a:r>
-              <a:rPr lang="en-US" sz="2162" dirty="0" smtClean="0">
-                <a:cs typeface="Courier New"/>
-              </a:rPr>
-              <a:t>Number of aligned reads covering that position (depth of coverage)</a:t>
-            </a:r>
-          </a:p>
-          <a:p>
-            <a:pPr marL="514350" indent="-514350">
-              <a:buFont typeface="+mj-lt"/>
-              <a:buAutoNum type="arabicPeriod"/>
-            </a:pPr>
-            <a:r>
-              <a:rPr lang="en-US" sz="2162" dirty="0" smtClean="0">
-                <a:cs typeface="Courier New"/>
-              </a:rPr>
-              <a:t>Bases at that position from aligned reads</a:t>
-            </a:r>
-          </a:p>
-          <a:p>
-            <a:pPr marL="514350" indent="-514350">
-              <a:buFont typeface="+mj-lt"/>
-              <a:buAutoNum type="arabicPeriod"/>
-            </a:pPr>
-            <a:r>
-              <a:rPr lang="en-US" sz="2162" dirty="0" smtClean="0">
-                <a:cs typeface="Courier New"/>
-              </a:rPr>
-              <a:t>Mapping quality of those bases (OPTIONAL)</a:t>
-            </a:r>
-            <a:endParaRPr lang="en-US" dirty="0">
-              <a:cs typeface="Courier New"/>
-            </a:endParaRPr>
+          <a:bodyPr/>
+          <a:lstStyle/>
+          <a:p>
+            <a:r>
+              <a:rPr lang="en-US" dirty="0" smtClean="0"/>
+              <a:t>Once data cleaning, alignment or assembly are complete, further annotation and variant calling follows</a:t>
+            </a:r>
+          </a:p>
+          <a:p>
+            <a:r>
+              <a:rPr lang="en-US" dirty="0" smtClean="0"/>
+              <a:t>Various tabular data conventions exist</a:t>
+            </a:r>
+          </a:p>
+          <a:p>
+            <a:pPr lvl="1"/>
+            <a:r>
+              <a:rPr lang="en-US" dirty="0" smtClean="0"/>
+              <a:t>BED</a:t>
+            </a:r>
+          </a:p>
+          <a:p>
+            <a:pPr lvl="1"/>
+            <a:r>
+              <a:rPr lang="en-US" dirty="0" smtClean="0"/>
+              <a:t>VCF</a:t>
+            </a:r>
+          </a:p>
+          <a:p>
+            <a:pPr lvl="1"/>
+            <a:r>
+              <a:rPr lang="en-US" dirty="0" smtClean="0"/>
+              <a:t>GFF3</a:t>
+            </a:r>
+            <a:endParaRPr lang="en-US" dirty="0" smtClean="0"/>
+          </a:p>
+          <a:p>
+            <a:r>
+              <a:rPr lang="en-US" dirty="0" smtClean="0"/>
+              <a:t>Also continuous annotations: WIG, </a:t>
+            </a:r>
+            <a:r>
+              <a:rPr lang="en-US" dirty="0" err="1" smtClean="0"/>
+              <a:t>BigWig</a:t>
+            </a:r>
+            <a:endParaRPr lang="en-US" dirty="0"/>
           </a:p>
         </p:txBody>
       </p:sp>
@@ -4717,7 +4589,7 @@
   <p:timing>
     <p:tnLst>
       <p:par>
-        <p:cTn id="1" dur="indefinite" restart="never" nodeType="tmRoot"/>
+        <p:cTn xmlns:p14="http://schemas.microsoft.com/office/powerpoint/2010/main" id="1" dur="indefinite" restart="never" nodeType="tmRoot"/>
       </p:par>
     </p:tnLst>
   </p:timing>
@@ -4725,7 +4597,7 @@
 </file>
 
 <file path=ppt/slides/slide13.xml><?xml version="1.0" encoding="utf-8"?>
-<p:sld xmlns:a="http://schemas.openxmlformats.org/drawingml/2006/main" xmlns:r="http://schemas.openxmlformats.org/officeDocument/2006/relationships" xmlns:mc="http://schemas.openxmlformats.org/markup-compatibility/2006" xmlns:mv="urn:schemas-microsoft-com:mac:vml" xmlns:p="http://schemas.openxmlformats.org/presentationml/2006/main" mc:Ignorable="mv" mc:PreserveAttributes="mv:*">
+<p:sld xmlns:a="http://schemas.openxmlformats.org/drawingml/2006/main" xmlns:r="http://schemas.openxmlformats.org/officeDocument/2006/relationships" xmlns:p="http://schemas.openxmlformats.org/presentationml/2006/main">
   <p:cSld>
     <p:spTree>
       <p:nvGrpSpPr>
@@ -4758,7 +4630,7 @@
           <a:p>
             <a:r>
               <a:rPr lang="en-US" dirty="0" smtClean="0"/>
-              <a:t>Tabular annotation files</a:t>
+              <a:t>Exercise: FASTQ errors</a:t>
             </a:r>
             <a:endParaRPr lang="en-US" dirty="0"/>
           </a:p>
@@ -4781,44 +4653,15 @@
           <a:p>
             <a:r>
               <a:rPr lang="en-US" dirty="0" smtClean="0"/>
-              <a:t>Once data cleaning, alignment or assembly are complete, further annotation and variant calling follows</a:t>
-            </a:r>
-          </a:p>
-          <a:p>
-            <a:r>
-              <a:rPr lang="en-US" dirty="0" smtClean="0"/>
-              <a:t>Various tabular data conventions exist</a:t>
-            </a:r>
-          </a:p>
-          <a:p>
-            <a:pPr lvl="1"/>
-            <a:r>
-              <a:rPr lang="en-US" dirty="0" smtClean="0"/>
-              <a:t>BED</a:t>
-            </a:r>
-          </a:p>
-          <a:p>
-            <a:pPr lvl="1"/>
-            <a:r>
-              <a:rPr lang="en-US" dirty="0" smtClean="0"/>
-              <a:t>VCF</a:t>
-            </a:r>
-          </a:p>
-          <a:p>
-            <a:pPr lvl="1"/>
-            <a:r>
-              <a:rPr lang="en-US" dirty="0" smtClean="0"/>
-              <a:t>GFF, GFF3, GTF</a:t>
-            </a:r>
-          </a:p>
-          <a:p>
-            <a:r>
-              <a:rPr lang="en-US" dirty="0" smtClean="0"/>
-              <a:t>Also continuous annotations: WIG, </a:t>
+              <a:t>The FASTQ files in the </a:t>
             </a:r>
             <a:r>
               <a:rPr lang="en-US" dirty="0" err="1" smtClean="0"/>
-              <a:t>BigWig</a:t>
+              <a:t>fastq_errors</a:t>
+            </a:r>
+            <a:r>
+              <a:rPr lang="en-US" dirty="0" smtClean="0"/>
+              <a:t> folder each have something wrong with them that can be diagnosed by eye. Open each file in a text editor, note what the error is and on which line it occurs.</a:t>
             </a:r>
             <a:endParaRPr lang="en-US" dirty="0"/>
           </a:p>
@@ -4832,15 +4675,15 @@
   <p:timing>
     <p:tnLst>
       <p:par>
-        <p:cTn id="1" dur="indefinite" restart="never" nodeType="tmRoot"/>
+        <p:cTn xmlns:p14="http://schemas.microsoft.com/office/powerpoint/2010/main" id="1" dur="indefinite" restart="never" nodeType="tmRoot"/>
       </p:par>
     </p:tnLst>
   </p:timing>
 </p:sld>
 </file>
 
-<file path=ppt/slides/slide14.xml><?xml version="1.0" encoding="utf-8"?>
-<p:sld xmlns:a="http://schemas.openxmlformats.org/drawingml/2006/main" xmlns:r="http://schemas.openxmlformats.org/officeDocument/2006/relationships" xmlns:mc="http://schemas.openxmlformats.org/markup-compatibility/2006" xmlns:mv="urn:schemas-microsoft-com:mac:vml" xmlns:p="http://schemas.openxmlformats.org/presentationml/2006/main" mc:Ignorable="mv" mc:PreserveAttributes="mv:*">
+<file path=ppt/slides/slide2.xml><?xml version="1.0" encoding="utf-8"?>
+<p:sld xmlns:a="http://schemas.openxmlformats.org/drawingml/2006/main" xmlns:r="http://schemas.openxmlformats.org/officeDocument/2006/relationships" xmlns:p="http://schemas.openxmlformats.org/presentationml/2006/main">
   <p:cSld>
     <p:spTree>
       <p:nvGrpSpPr>
@@ -4873,7 +4716,7 @@
           <a:p>
             <a:r>
               <a:rPr lang="en-US" dirty="0" smtClean="0"/>
-              <a:t>Exercise: FASTQ errors</a:t>
+              <a:t>NGS file formats</a:t>
             </a:r>
             <a:endParaRPr lang="en-US" dirty="0"/>
           </a:p>
@@ -4886,27 +4729,98 @@
             <a:spLocks noGrp="1"/>
           </p:cNvSpPr>
           <p:nvPr>
-            <p:ph idx="1"/>
-          </p:nvPr>
-        </p:nvSpPr>
-        <p:spPr/>
-        <p:txBody>
-          <a:bodyPr/>
-          <a:lstStyle/>
-          <a:p>
-            <a:r>
-              <a:rPr lang="en-US" dirty="0" smtClean="0"/>
-              <a:t>The FASTQ files in the </a:t>
-            </a:r>
-            <a:r>
-              <a:rPr lang="en-US" dirty="0" err="1" smtClean="0"/>
-              <a:t>fastq_errors</a:t>
-            </a:r>
-            <a:r>
-              <a:rPr lang="en-US" dirty="0" smtClean="0"/>
-              <a:t> folder each have something wrong with them that can be diagnosed by eye. Open each file in a text editor, note what the error is and on which line it occurs.</a:t>
+            <p:ph sz="half" idx="1"/>
+          </p:nvPr>
+        </p:nvSpPr>
+        <p:spPr/>
+        <p:txBody>
+          <a:bodyPr/>
+          <a:lstStyle/>
+          <a:p>
+            <a:r>
+              <a:rPr lang="en-US" dirty="0" smtClean="0"/>
+              <a:t>Binary or text-based</a:t>
+            </a:r>
+          </a:p>
+          <a:p>
+            <a:r>
+              <a:rPr lang="en-US" dirty="0" smtClean="0"/>
+              <a:t>High-volume, simple</a:t>
+            </a:r>
+          </a:p>
+          <a:p>
+            <a:r>
+              <a:rPr lang="en-US" dirty="0" smtClean="0"/>
+              <a:t>Single sequence or aligned</a:t>
+            </a:r>
+          </a:p>
+          <a:p>
+            <a:r>
+              <a:rPr lang="en-US" dirty="0" smtClean="0"/>
+              <a:t>With quality </a:t>
+            </a:r>
+            <a:r>
+              <a:rPr lang="en-US" dirty="0" smtClean="0"/>
+              <a:t>scores</a:t>
+            </a:r>
+          </a:p>
+          <a:p>
+            <a:r>
+              <a:rPr lang="en-US" dirty="0" smtClean="0"/>
+              <a:t>Also: annotations and variants</a:t>
             </a:r>
             <a:endParaRPr lang="en-US" dirty="0"/>
+          </a:p>
+        </p:txBody>
+      </p:sp>
+      <p:sp>
+        <p:nvSpPr>
+          <p:cNvPr id="4" name="Content Placeholder 3"/>
+          <p:cNvSpPr>
+            <a:spLocks noGrp="1"/>
+          </p:cNvSpPr>
+          <p:nvPr>
+            <p:ph sz="half" idx="2"/>
+          </p:nvPr>
+        </p:nvSpPr>
+        <p:spPr/>
+        <p:txBody>
+          <a:bodyPr/>
+          <a:lstStyle/>
+          <a:p>
+            <a:r>
+              <a:rPr lang="en-US" b="1" dirty="0" smtClean="0"/>
+              <a:t>FASTA+QUAL</a:t>
+            </a:r>
+          </a:p>
+          <a:p>
+            <a:r>
+              <a:rPr lang="en-US" b="1" dirty="0" smtClean="0"/>
+              <a:t>FASTQ</a:t>
+            </a:r>
+          </a:p>
+          <a:p>
+            <a:r>
+              <a:rPr lang="en-US" b="1" dirty="0" smtClean="0"/>
+              <a:t>SAM/BAM</a:t>
+            </a:r>
+          </a:p>
+          <a:p>
+            <a:r>
+              <a:rPr lang="en-US" b="1" dirty="0" smtClean="0"/>
+              <a:t>Pileup</a:t>
+            </a:r>
+          </a:p>
+          <a:p>
+            <a:r>
+              <a:rPr lang="en-US" b="1" dirty="0" smtClean="0"/>
+              <a:t>VCF</a:t>
+            </a:r>
+            <a:r>
+              <a:rPr lang="en-US" b="1" dirty="0" smtClean="0"/>
+              <a:t>/BED/GFF3</a:t>
+            </a:r>
+            <a:endParaRPr lang="en-US" b="1" dirty="0"/>
           </a:p>
         </p:txBody>
       </p:sp>
@@ -4918,15 +4832,15 @@
   <p:timing>
     <p:tnLst>
       <p:par>
-        <p:cTn id="1" dur="indefinite" restart="never" nodeType="tmRoot"/>
+        <p:cTn xmlns:p14="http://schemas.microsoft.com/office/powerpoint/2010/main" id="1" dur="indefinite" restart="never" nodeType="tmRoot"/>
       </p:par>
     </p:tnLst>
   </p:timing>
 </p:sld>
 </file>
 
-<file path=ppt/slides/slide2.xml><?xml version="1.0" encoding="utf-8"?>
-<p:sld xmlns:a="http://schemas.openxmlformats.org/drawingml/2006/main" xmlns:r="http://schemas.openxmlformats.org/officeDocument/2006/relationships" xmlns:mc="http://schemas.openxmlformats.org/markup-compatibility/2006" xmlns:mv="urn:schemas-microsoft-com:mac:vml" xmlns:p="http://schemas.openxmlformats.org/presentationml/2006/main" mc:Ignorable="mv" mc:PreserveAttributes="mv:*">
+<file path=ppt/slides/slide3.xml><?xml version="1.0" encoding="utf-8"?>
+<p:sld xmlns:a="http://schemas.openxmlformats.org/drawingml/2006/main" xmlns:r="http://schemas.openxmlformats.org/officeDocument/2006/relationships" xmlns:p="http://schemas.openxmlformats.org/presentationml/2006/main">
   <p:cSld>
     <p:spTree>
       <p:nvGrpSpPr>
@@ -4958,153 +4872,6 @@
           <a:lstStyle/>
           <a:p>
             <a:r>
-              <a:rPr lang="en-US" dirty="0" smtClean="0"/>
-              <a:t>NGS file formats</a:t>
-            </a:r>
-            <a:endParaRPr lang="en-US" dirty="0"/>
-          </a:p>
-        </p:txBody>
-      </p:sp>
-      <p:sp>
-        <p:nvSpPr>
-          <p:cNvPr id="3" name="Content Placeholder 2"/>
-          <p:cNvSpPr>
-            <a:spLocks noGrp="1"/>
-          </p:cNvSpPr>
-          <p:nvPr>
-            <p:ph sz="half" idx="1"/>
-          </p:nvPr>
-        </p:nvSpPr>
-        <p:spPr/>
-        <p:txBody>
-          <a:bodyPr/>
-          <a:lstStyle/>
-          <a:p>
-            <a:r>
-              <a:rPr lang="en-US" dirty="0" smtClean="0"/>
-              <a:t>Binary or text-based</a:t>
-            </a:r>
-          </a:p>
-          <a:p>
-            <a:r>
-              <a:rPr lang="en-US" dirty="0" smtClean="0"/>
-              <a:t>High-volume, simple</a:t>
-            </a:r>
-          </a:p>
-          <a:p>
-            <a:r>
-              <a:rPr lang="en-US" dirty="0" smtClean="0"/>
-              <a:t>Single sequence or aligned</a:t>
-            </a:r>
-          </a:p>
-          <a:p>
-            <a:r>
-              <a:rPr lang="en-US" dirty="0" smtClean="0"/>
-              <a:t>With quality scores</a:t>
-            </a:r>
-            <a:endParaRPr lang="en-US" dirty="0"/>
-          </a:p>
-        </p:txBody>
-      </p:sp>
-      <p:sp>
-        <p:nvSpPr>
-          <p:cNvPr id="4" name="Content Placeholder 3"/>
-          <p:cNvSpPr>
-            <a:spLocks noGrp="1"/>
-          </p:cNvSpPr>
-          <p:nvPr>
-            <p:ph sz="half" idx="2"/>
-          </p:nvPr>
-        </p:nvSpPr>
-        <p:spPr/>
-        <p:txBody>
-          <a:bodyPr/>
-          <a:lstStyle/>
-          <a:p>
-            <a:r>
-              <a:rPr lang="en-US" b="1" dirty="0" smtClean="0"/>
-              <a:t>FASTA+QUAL</a:t>
-            </a:r>
-          </a:p>
-          <a:p>
-            <a:r>
-              <a:rPr lang="en-US" b="1" dirty="0" smtClean="0"/>
-              <a:t>FASTQ</a:t>
-            </a:r>
-          </a:p>
-          <a:p>
-            <a:r>
-              <a:rPr lang="en-US" b="1" dirty="0" smtClean="0"/>
-              <a:t>SAM/BAM</a:t>
-            </a:r>
-          </a:p>
-          <a:p>
-            <a:r>
-              <a:rPr lang="en-US" b="1" dirty="0" smtClean="0"/>
-              <a:t>Pileup</a:t>
-            </a:r>
-          </a:p>
-          <a:p>
-            <a:r>
-              <a:rPr lang="en-US" b="1" dirty="0" smtClean="0"/>
-              <a:t>VCF/BED</a:t>
-            </a:r>
-            <a:r>
-              <a:rPr lang="en-US" b="1" smtClean="0"/>
-              <a:t>/GFF/GTF</a:t>
-            </a:r>
-            <a:endParaRPr lang="en-US" b="1" dirty="0"/>
-          </a:p>
-        </p:txBody>
-      </p:sp>
-    </p:spTree>
-  </p:cSld>
-  <p:clrMapOvr>
-    <a:masterClrMapping/>
-  </p:clrMapOvr>
-  <p:timing>
-    <p:tnLst>
-      <p:par>
-        <p:cTn id="1" dur="indefinite" restart="never" nodeType="tmRoot"/>
-      </p:par>
-    </p:tnLst>
-  </p:timing>
-</p:sld>
-</file>
-
-<file path=ppt/slides/slide3.xml><?xml version="1.0" encoding="utf-8"?>
-<p:sld xmlns:a="http://schemas.openxmlformats.org/drawingml/2006/main" xmlns:r="http://schemas.openxmlformats.org/officeDocument/2006/relationships" xmlns:mc="http://schemas.openxmlformats.org/markup-compatibility/2006" xmlns:mv="urn:schemas-microsoft-com:mac:vml" xmlns:p="http://schemas.openxmlformats.org/presentationml/2006/main" mc:Ignorable="mv" mc:PreserveAttributes="mv:*">
-  <p:cSld>
-    <p:spTree>
-      <p:nvGrpSpPr>
-        <p:cNvPr id="1" name=""/>
-        <p:cNvGrpSpPr/>
-        <p:nvPr/>
-      </p:nvGrpSpPr>
-      <p:grpSpPr>
-        <a:xfrm>
-          <a:off x="0" y="0"/>
-          <a:ext cx="0" cy="0"/>
-          <a:chOff x="0" y="0"/>
-          <a:chExt cx="0" cy="0"/>
-        </a:xfrm>
-      </p:grpSpPr>
-      <p:sp>
-        <p:nvSpPr>
-          <p:cNvPr id="2" name="Title 1"/>
-          <p:cNvSpPr>
-            <a:spLocks noGrp="1"/>
-          </p:cNvSpPr>
-          <p:nvPr>
-            <p:ph type="title"/>
-          </p:nvPr>
-        </p:nvSpPr>
-        <p:spPr/>
-        <p:txBody>
-          <a:bodyPr/>
-          <a:lstStyle/>
-          <a:p>
-            <a:r>
               <a:rPr lang="en-US" dirty="0" err="1" smtClean="0"/>
               <a:t>Phred</a:t>
             </a:r>
@@ -5195,7 +4962,7 @@
   <p:timing>
     <p:tnLst>
       <p:par>
-        <p:cTn id="1" dur="indefinite" restart="never" nodeType="tmRoot"/>
+        <p:cTn xmlns:p14="http://schemas.microsoft.com/office/powerpoint/2010/main" id="1" dur="indefinite" restart="never" nodeType="tmRoot"/>
       </p:par>
     </p:tnLst>
   </p:timing>
@@ -5203,7 +4970,7 @@
 </file>
 
 <file path=ppt/slides/slide4.xml><?xml version="1.0" encoding="utf-8"?>
-<p:sld xmlns:a="http://schemas.openxmlformats.org/drawingml/2006/main" xmlns:r="http://schemas.openxmlformats.org/officeDocument/2006/relationships" xmlns:mc="http://schemas.openxmlformats.org/markup-compatibility/2006" xmlns:mv="urn:schemas-microsoft-com:mac:vml" xmlns:p="http://schemas.openxmlformats.org/presentationml/2006/main" mc:Ignorable="mv" mc:PreserveAttributes="mv:*">
+<p:sld xmlns:a="http://schemas.openxmlformats.org/drawingml/2006/main" xmlns:r="http://schemas.openxmlformats.org/officeDocument/2006/relationships" xmlns:p="http://schemas.openxmlformats.org/presentationml/2006/main">
   <p:cSld>
     <p:spTree>
       <p:nvGrpSpPr>
@@ -5603,7 +5370,7 @@
   <p:timing>
     <p:tnLst>
       <p:par>
-        <p:cTn id="1" dur="indefinite" restart="never" nodeType="tmRoot"/>
+        <p:cTn xmlns:p14="http://schemas.microsoft.com/office/powerpoint/2010/main" id="1" dur="indefinite" restart="never" nodeType="tmRoot"/>
       </p:par>
     </p:tnLst>
   </p:timing>
@@ -5611,7 +5378,7 @@
 </file>
 
 <file path=ppt/slides/slide5.xml><?xml version="1.0" encoding="utf-8"?>
-<p:sld xmlns:a="http://schemas.openxmlformats.org/drawingml/2006/main" xmlns:r="http://schemas.openxmlformats.org/officeDocument/2006/relationships" xmlns:mc="http://schemas.openxmlformats.org/markup-compatibility/2006" xmlns:mv="urn:schemas-microsoft-com:mac:vml" xmlns:p="http://schemas.openxmlformats.org/presentationml/2006/main" mc:Ignorable="mv" mc:PreserveAttributes="mv:*">
+<p:sld xmlns:a="http://schemas.openxmlformats.org/drawingml/2006/main" xmlns:r="http://schemas.openxmlformats.org/officeDocument/2006/relationships" xmlns:p="http://schemas.openxmlformats.org/presentationml/2006/main">
   <p:cSld>
     <p:spTree>
       <p:nvGrpSpPr>
@@ -5681,7 +5448,7 @@
   <p:timing>
     <p:tnLst>
       <p:par>
-        <p:cTn id="1" dur="indefinite" restart="never" nodeType="tmRoot"/>
+        <p:cTn xmlns:p14="http://schemas.microsoft.com/office/powerpoint/2010/main" id="1" dur="indefinite" restart="never" nodeType="tmRoot"/>
       </p:par>
     </p:tnLst>
   </p:timing>
@@ -5689,7 +5456,7 @@
 </file>
 
 <file path=ppt/slides/slide6.xml><?xml version="1.0" encoding="utf-8"?>
-<p:sld xmlns:a="http://schemas.openxmlformats.org/drawingml/2006/main" xmlns:r="http://schemas.openxmlformats.org/officeDocument/2006/relationships" xmlns:mc="http://schemas.openxmlformats.org/markup-compatibility/2006" xmlns:mv="urn:schemas-microsoft-com:mac:vml" xmlns:p="http://schemas.openxmlformats.org/presentationml/2006/main" mc:Ignorable="mv" mc:PreserveAttributes="mv:*">
+<p:sld xmlns:a="http://schemas.openxmlformats.org/drawingml/2006/main" xmlns:r="http://schemas.openxmlformats.org/officeDocument/2006/relationships" xmlns:p="http://schemas.openxmlformats.org/presentationml/2006/main">
   <p:cSld>
     <p:spTree>
       <p:nvGrpSpPr>
@@ -5845,7 +5612,7 @@
   <p:timing>
     <p:tnLst>
       <p:par>
-        <p:cTn id="1" dur="indefinite" restart="never" nodeType="tmRoot"/>
+        <p:cTn xmlns:p14="http://schemas.microsoft.com/office/powerpoint/2010/main" id="1" dur="indefinite" restart="never" nodeType="tmRoot"/>
       </p:par>
     </p:tnLst>
   </p:timing>
@@ -5853,7 +5620,7 @@
 </file>
 
 <file path=ppt/slides/slide7.xml><?xml version="1.0" encoding="utf-8"?>
-<p:sld xmlns:a="http://schemas.openxmlformats.org/drawingml/2006/main" xmlns:r="http://schemas.openxmlformats.org/officeDocument/2006/relationships" xmlns:mc="http://schemas.openxmlformats.org/markup-compatibility/2006" xmlns:mv="urn:schemas-microsoft-com:mac:vml" xmlns:p="http://schemas.openxmlformats.org/presentationml/2006/main" mc:Ignorable="mv" mc:PreserveAttributes="mv:*">
+<p:sld xmlns:a="http://schemas.openxmlformats.org/drawingml/2006/main" xmlns:r="http://schemas.openxmlformats.org/officeDocument/2006/relationships" xmlns:p="http://schemas.openxmlformats.org/presentationml/2006/main">
   <p:cSld>
     <p:spTree>
       <p:nvGrpSpPr>
@@ -5924,7 +5691,7 @@
   <p:timing>
     <p:tnLst>
       <p:par>
-        <p:cTn id="1" dur="indefinite" restart="never" nodeType="tmRoot"/>
+        <p:cTn xmlns:p14="http://schemas.microsoft.com/office/powerpoint/2010/main" id="1" dur="indefinite" restart="never" nodeType="tmRoot"/>
       </p:par>
     </p:tnLst>
   </p:timing>
@@ -5932,7 +5699,7 @@
 </file>
 
 <file path=ppt/slides/slide8.xml><?xml version="1.0" encoding="utf-8"?>
-<p:sld xmlns:a="http://schemas.openxmlformats.org/drawingml/2006/main" xmlns:r="http://schemas.openxmlformats.org/officeDocument/2006/relationships" xmlns:mc="http://schemas.openxmlformats.org/markup-compatibility/2006" xmlns:mv="urn:schemas-microsoft-com:mac:vml" xmlns:p="http://schemas.openxmlformats.org/presentationml/2006/main" mc:Ignorable="mv" mc:PreserveAttributes="mv:*">
+<p:sld xmlns:a="http://schemas.openxmlformats.org/drawingml/2006/main" xmlns:r="http://schemas.openxmlformats.org/officeDocument/2006/relationships" xmlns:p="http://schemas.openxmlformats.org/presentationml/2006/main">
   <p:cSld>
     <p:spTree>
       <p:nvGrpSpPr>
@@ -6134,7 +5901,7 @@
   <p:timing>
     <p:tnLst>
       <p:par>
-        <p:cTn id="1" dur="indefinite" restart="never" nodeType="tmRoot"/>
+        <p:cTn xmlns:p14="http://schemas.microsoft.com/office/powerpoint/2010/main" id="1" dur="indefinite" restart="never" nodeType="tmRoot"/>
       </p:par>
     </p:tnLst>
   </p:timing>
@@ -6142,7 +5909,7 @@
 </file>
 
 <file path=ppt/slides/slide9.xml><?xml version="1.0" encoding="utf-8"?>
-<p:sld xmlns:a="http://schemas.openxmlformats.org/drawingml/2006/main" xmlns:r="http://schemas.openxmlformats.org/officeDocument/2006/relationships" xmlns:mc="http://schemas.openxmlformats.org/markup-compatibility/2006" xmlns:mv="urn:schemas-microsoft-com:mac:vml" xmlns:p="http://schemas.openxmlformats.org/presentationml/2006/main" mc:Ignorable="mv" mc:PreserveAttributes="mv:*">
+<p:sld xmlns:a="http://schemas.openxmlformats.org/drawingml/2006/main" xmlns:r="http://schemas.openxmlformats.org/officeDocument/2006/relationships" xmlns:p="http://schemas.openxmlformats.org/presentationml/2006/main">
   <p:cSld>
     <p:spTree>
       <p:nvGrpSpPr>
@@ -6175,201 +5942,62 @@
           <a:p>
             <a:r>
               <a:rPr lang="en-US" dirty="0" smtClean="0"/>
-              <a:t>Standard </a:t>
-            </a:r>
+              <a:t>SAM/BAM</a:t>
+            </a:r>
+            <a:endParaRPr lang="en-US" dirty="0"/>
+          </a:p>
+        </p:txBody>
+      </p:sp>
+      <p:sp>
+        <p:nvSpPr>
+          <p:cNvPr id="5" name="Content Placeholder 4"/>
+          <p:cNvSpPr>
+            <a:spLocks noGrp="1"/>
+          </p:cNvSpPr>
+          <p:nvPr>
+            <p:ph idx="1"/>
+          </p:nvPr>
+        </p:nvSpPr>
+        <p:spPr/>
+        <p:txBody>
+          <a:bodyPr/>
+          <a:lstStyle/>
+          <a:p>
+            <a:r>
+              <a:rPr lang="en-US" dirty="0" smtClean="0"/>
+              <a:t>Encodes reads aligned to a reference sequence</a:t>
+            </a:r>
+          </a:p>
+          <a:p>
+            <a:r>
+              <a:rPr lang="en-US" dirty="0" smtClean="0"/>
+              <a:t>Textual (SAM) and binary representations (BAM)</a:t>
+            </a:r>
+          </a:p>
+          <a:p>
             <a:r>
               <a:rPr lang="en-US" dirty="0" err="1" smtClean="0"/>
-              <a:t>Flowgram</a:t>
-            </a:r>
-            <a:r>
-              <a:rPr lang="en-US" dirty="0" smtClean="0"/>
-              <a:t> Format</a:t>
-            </a:r>
-            <a:endParaRPr lang="en-US" dirty="0"/>
-          </a:p>
-        </p:txBody>
-      </p:sp>
-      <p:sp>
-        <p:nvSpPr>
-          <p:cNvPr id="8" name="Text Placeholder 7"/>
-          <p:cNvSpPr>
-            <a:spLocks noGrp="1"/>
-          </p:cNvSpPr>
-          <p:nvPr>
-            <p:ph type="body" idx="1"/>
-          </p:nvPr>
-        </p:nvSpPr>
-        <p:spPr/>
-        <p:txBody>
-          <a:bodyPr/>
-          <a:lstStyle/>
-          <a:p>
-            <a:r>
-              <a:rPr lang="en-US" dirty="0" smtClean="0"/>
-              <a:t>Description</a:t>
-            </a:r>
-            <a:endParaRPr lang="en-US" dirty="0"/>
-          </a:p>
-        </p:txBody>
-      </p:sp>
-      <p:sp>
-        <p:nvSpPr>
-          <p:cNvPr id="3" name="Content Placeholder 2"/>
-          <p:cNvSpPr>
-            <a:spLocks noGrp="1"/>
-          </p:cNvSpPr>
-          <p:nvPr>
-            <p:ph sz="half" idx="2"/>
-          </p:nvPr>
-        </p:nvSpPr>
-        <p:spPr/>
-        <p:txBody>
-          <a:bodyPr/>
-          <a:lstStyle/>
-          <a:p>
-            <a:r>
-              <a:rPr lang="en-US" dirty="0" smtClean="0"/>
-              <a:t>SFF file format is a container file for storing one or many 454 reads.</a:t>
-            </a:r>
-          </a:p>
-          <a:p>
-            <a:r>
-              <a:rPr lang="en-US" dirty="0" smtClean="0"/>
-              <a:t>Binary format</a:t>
-            </a:r>
-          </a:p>
-          <a:p>
-            <a:r>
-              <a:rPr lang="en-US" dirty="0" smtClean="0"/>
-              <a:t>Structure:</a:t>
-            </a:r>
-          </a:p>
-          <a:p>
-            <a:pPr lvl="1"/>
-            <a:r>
-              <a:rPr lang="en-US" dirty="0" smtClean="0"/>
-              <a:t>Common header with metadata</a:t>
-            </a:r>
-          </a:p>
-          <a:p>
-            <a:pPr lvl="1"/>
-            <a:r>
-              <a:rPr lang="en-US" dirty="0" smtClean="0"/>
-              <a:t>Read header</a:t>
-            </a:r>
-          </a:p>
-          <a:p>
-            <a:pPr lvl="1"/>
-            <a:r>
-              <a:rPr lang="en-US" dirty="0" smtClean="0"/>
-              <a:t>Read data</a:t>
-            </a:r>
-            <a:endParaRPr lang="en-US" dirty="0"/>
-          </a:p>
-        </p:txBody>
-      </p:sp>
-      <p:sp>
-        <p:nvSpPr>
-          <p:cNvPr id="9" name="Text Placeholder 8"/>
-          <p:cNvSpPr>
-            <a:spLocks noGrp="1"/>
-          </p:cNvSpPr>
-          <p:nvPr>
-            <p:ph type="body" sz="quarter" idx="3"/>
-          </p:nvPr>
-        </p:nvSpPr>
-        <p:spPr/>
-        <p:txBody>
-          <a:bodyPr/>
-          <a:lstStyle/>
-          <a:p>
-            <a:r>
-              <a:rPr lang="en-US" dirty="0" smtClean="0"/>
-              <a:t>Tools</a:t>
-            </a:r>
-            <a:endParaRPr lang="en-US" dirty="0"/>
-          </a:p>
-        </p:txBody>
-      </p:sp>
-      <p:sp>
-        <p:nvSpPr>
-          <p:cNvPr id="10" name="Content Placeholder 9"/>
-          <p:cNvSpPr>
-            <a:spLocks noGrp="1"/>
-          </p:cNvSpPr>
-          <p:nvPr>
-            <p:ph sz="quarter" idx="4"/>
-          </p:nvPr>
-        </p:nvSpPr>
-        <p:spPr/>
-        <p:txBody>
-          <a:bodyPr/>
-          <a:lstStyle/>
-          <a:p>
-            <a:r>
-              <a:rPr lang="en-US" b="1" dirty="0" err="1" smtClean="0"/>
-              <a:t>sffinfo</a:t>
-            </a:r>
-            <a:r>
-              <a:rPr lang="en-US" b="1" dirty="0" smtClean="0"/>
-              <a:t> </a:t>
-            </a:r>
-            <a:r>
-              <a:rPr lang="en-US" dirty="0" smtClean="0"/>
-              <a:t>- from 454</a:t>
-            </a:r>
-          </a:p>
-          <a:p>
-            <a:r>
-              <a:rPr lang="en-US" b="1" dirty="0" err="1" smtClean="0"/>
-              <a:t>sff_extract</a:t>
-            </a:r>
-            <a:r>
-              <a:rPr lang="en-US" b="1" dirty="0" smtClean="0"/>
-              <a:t> </a:t>
-            </a:r>
-            <a:r>
-              <a:rPr lang="en-US" dirty="0" smtClean="0"/>
-              <a:t>- python</a:t>
-            </a:r>
-          </a:p>
-          <a:p>
-            <a:r>
-              <a:rPr lang="en-US" b="1" dirty="0" err="1" smtClean="0"/>
-              <a:t>Bio::SFF</a:t>
-            </a:r>
-            <a:r>
-              <a:rPr lang="en-US" b="1" dirty="0" smtClean="0"/>
-              <a:t> </a:t>
-            </a:r>
-            <a:r>
-              <a:rPr lang="en-US" dirty="0" smtClean="0"/>
-              <a:t>- </a:t>
+              <a:t>Samtools</a:t>
+            </a:r>
+            <a:r>
+              <a:rPr lang="en-US" dirty="0" smtClean="0"/>
+              <a:t>, </a:t>
             </a:r>
             <a:r>
               <a:rPr lang="en-US" dirty="0" err="1" smtClean="0"/>
-              <a:t>perl</a:t>
-            </a:r>
-            <a:endParaRPr lang="en-US" dirty="0" smtClean="0"/>
-          </a:p>
-          <a:p>
-            <a:r>
-              <a:rPr lang="en-US" b="1" dirty="0" smtClean="0"/>
-              <a:t>sff2fastq </a:t>
-            </a:r>
-            <a:r>
-              <a:rPr lang="en-US" dirty="0" smtClean="0"/>
-              <a:t>- binary</a:t>
-            </a:r>
-          </a:p>
-          <a:p>
-            <a:r>
-              <a:rPr lang="en-US" b="1" dirty="0" smtClean="0"/>
-              <a:t>SFF Workbench </a:t>
-            </a:r>
-            <a:r>
-              <a:rPr lang="en-US" dirty="0" smtClean="0"/>
-              <a:t>- graphical</a:t>
+              <a:t>picard</a:t>
+            </a:r>
+            <a:r>
+              <a:rPr lang="en-US" dirty="0" smtClean="0"/>
+              <a:t>, EMBOSS, (</a:t>
+            </a:r>
+            <a:r>
+              <a:rPr lang="en-US" dirty="0" err="1" smtClean="0"/>
+              <a:t>Bio::SamTools</a:t>
+            </a:r>
+            <a:r>
+              <a:rPr lang="en-US" dirty="0" smtClean="0"/>
+              <a:t>, Galaxy)</a:t>
             </a:r>
             <a:endParaRPr lang="en-US" dirty="0"/>
           </a:p>
@@ -6383,7 +6011,7 @@
   <p:timing>
     <p:tnLst>
       <p:par>
-        <p:cTn id="1" dur="indefinite" restart="never" nodeType="tmRoot"/>
+        <p:cTn xmlns:p14="http://schemas.microsoft.com/office/powerpoint/2010/main" id="1" dur="indefinite" restart="never" nodeType="tmRoot"/>
       </p:par>
     </p:tnLst>
   </p:timing>

</xml_diff>